<commit_message>
Reorganized some of slides
</commit_message>
<xml_diff>
--- a/Qt.pptx
+++ b/Qt.pptx
@@ -218,7 +218,7 @@
           <a:p>
             <a:fld id="{61A71368-9B8A-42D5-8701-A40D436A10D8}" type="datetimeFigureOut">
               <a:rPr lang="en-US" smtClean="0"/>
-              <a:t>9/19/2016</a:t>
+              <a:t>9/20/2016</a:t>
             </a:fld>
             <a:endParaRPr lang="en-US"/>
           </a:p>
@@ -384,7 +384,7 @@
           <a:p>
             <a:fld id="{E142B152-94EB-4A13-9545-4406A5E40B02}" type="datetimeFigureOut">
               <a:rPr lang="en-US" smtClean="0"/>
-              <a:t>9/19/2016</a:t>
+              <a:t>9/20/2016</a:t>
             </a:fld>
             <a:endParaRPr lang="en-US"/>
           </a:p>
@@ -836,7 +836,7 @@
           <a:p>
             <a:fld id="{CE81AE5B-AA08-4C55-A0DF-4A11A5556E1A}" type="datetimeFigureOut">
               <a:rPr lang="en-US" smtClean="0"/>
-              <a:t>9/19/2016</a:t>
+              <a:t>9/20/2016</a:t>
             </a:fld>
             <a:endParaRPr lang="en-US"/>
           </a:p>
@@ -1111,7 +1111,7 @@
           <a:p>
             <a:fld id="{CE81AE5B-AA08-4C55-A0DF-4A11A5556E1A}" type="datetimeFigureOut">
               <a:rPr lang="en-US" smtClean="0"/>
-              <a:t>9/19/2016</a:t>
+              <a:t>9/20/2016</a:t>
             </a:fld>
             <a:endParaRPr lang="en-US"/>
           </a:p>
@@ -1305,7 +1305,7 @@
           <a:p>
             <a:fld id="{CE81AE5B-AA08-4C55-A0DF-4A11A5556E1A}" type="datetimeFigureOut">
               <a:rPr lang="en-US" smtClean="0"/>
-              <a:t>9/19/2016</a:t>
+              <a:t>9/20/2016</a:t>
             </a:fld>
             <a:endParaRPr lang="en-US"/>
           </a:p>
@@ -1573,7 +1573,7 @@
           <a:p>
             <a:fld id="{CE81AE5B-AA08-4C55-A0DF-4A11A5556E1A}" type="datetimeFigureOut">
               <a:rPr lang="en-US" smtClean="0"/>
-              <a:t>9/19/2016</a:t>
+              <a:t>9/20/2016</a:t>
             </a:fld>
             <a:endParaRPr lang="en-US"/>
           </a:p>
@@ -1905,7 +1905,7 @@
           <a:p>
             <a:fld id="{CE81AE5B-AA08-4C55-A0DF-4A11A5556E1A}" type="datetimeFigureOut">
               <a:rPr lang="en-US" smtClean="0"/>
-              <a:t>9/19/2016</a:t>
+              <a:t>9/20/2016</a:t>
             </a:fld>
             <a:endParaRPr lang="en-US"/>
           </a:p>
@@ -2515,7 +2515,7 @@
           <a:p>
             <a:fld id="{CE81AE5B-AA08-4C55-A0DF-4A11A5556E1A}" type="datetimeFigureOut">
               <a:rPr lang="en-US" smtClean="0"/>
-              <a:t>9/19/2016</a:t>
+              <a:t>9/20/2016</a:t>
             </a:fld>
             <a:endParaRPr lang="en-US"/>
           </a:p>
@@ -3362,7 +3362,7 @@
           <a:p>
             <a:fld id="{CE81AE5B-AA08-4C55-A0DF-4A11A5556E1A}" type="datetimeFigureOut">
               <a:rPr lang="en-US" smtClean="0"/>
-              <a:t>9/19/2016</a:t>
+              <a:t>9/20/2016</a:t>
             </a:fld>
             <a:endParaRPr lang="en-US"/>
           </a:p>
@@ -3532,7 +3532,7 @@
           <a:p>
             <a:fld id="{CE81AE5B-AA08-4C55-A0DF-4A11A5556E1A}" type="datetimeFigureOut">
               <a:rPr lang="en-US" smtClean="0"/>
-              <a:t>9/19/2016</a:t>
+              <a:t>9/20/2016</a:t>
             </a:fld>
             <a:endParaRPr lang="en-US"/>
           </a:p>
@@ -3712,7 +3712,7 @@
           <a:p>
             <a:fld id="{CE81AE5B-AA08-4C55-A0DF-4A11A5556E1A}" type="datetimeFigureOut">
               <a:rPr lang="en-US" smtClean="0"/>
-              <a:t>9/19/2016</a:t>
+              <a:t>9/20/2016</a:t>
             </a:fld>
             <a:endParaRPr lang="en-US"/>
           </a:p>
@@ -3882,7 +3882,7 @@
           <a:p>
             <a:fld id="{CE81AE5B-AA08-4C55-A0DF-4A11A5556E1A}" type="datetimeFigureOut">
               <a:rPr lang="en-US" smtClean="0"/>
-              <a:t>9/19/2016</a:t>
+              <a:t>9/20/2016</a:t>
             </a:fld>
             <a:endParaRPr lang="en-US"/>
           </a:p>
@@ -4126,7 +4126,7 @@
           <a:p>
             <a:fld id="{CE81AE5B-AA08-4C55-A0DF-4A11A5556E1A}" type="datetimeFigureOut">
               <a:rPr lang="en-US" smtClean="0"/>
-              <a:t>9/19/2016</a:t>
+              <a:t>9/20/2016</a:t>
             </a:fld>
             <a:endParaRPr lang="en-US"/>
           </a:p>
@@ -4418,7 +4418,7 @@
           <a:p>
             <a:fld id="{CE81AE5B-AA08-4C55-A0DF-4A11A5556E1A}" type="datetimeFigureOut">
               <a:rPr lang="en-US" smtClean="0"/>
-              <a:t>9/19/2016</a:t>
+              <a:t>9/20/2016</a:t>
             </a:fld>
             <a:endParaRPr lang="en-US"/>
           </a:p>
@@ -4856,7 +4856,7 @@
           <a:p>
             <a:fld id="{CE81AE5B-AA08-4C55-A0DF-4A11A5556E1A}" type="datetimeFigureOut">
               <a:rPr lang="en-US" smtClean="0"/>
-              <a:t>9/19/2016</a:t>
+              <a:t>9/20/2016</a:t>
             </a:fld>
             <a:endParaRPr lang="en-US"/>
           </a:p>
@@ -4974,7 +4974,7 @@
           <a:p>
             <a:fld id="{CE81AE5B-AA08-4C55-A0DF-4A11A5556E1A}" type="datetimeFigureOut">
               <a:rPr lang="en-US" smtClean="0"/>
-              <a:t>9/19/2016</a:t>
+              <a:t>9/20/2016</a:t>
             </a:fld>
             <a:endParaRPr lang="en-US"/>
           </a:p>
@@ -5069,7 +5069,7 @@
           <a:p>
             <a:fld id="{CE81AE5B-AA08-4C55-A0DF-4A11A5556E1A}" type="datetimeFigureOut">
               <a:rPr lang="en-US" smtClean="0"/>
-              <a:t>9/19/2016</a:t>
+              <a:t>9/20/2016</a:t>
             </a:fld>
             <a:endParaRPr lang="en-US"/>
           </a:p>
@@ -5348,7 +5348,7 @@
           <a:p>
             <a:fld id="{CE81AE5B-AA08-4C55-A0DF-4A11A5556E1A}" type="datetimeFigureOut">
               <a:rPr lang="en-US" smtClean="0"/>
-              <a:t>9/19/2016</a:t>
+              <a:t>9/20/2016</a:t>
             </a:fld>
             <a:endParaRPr lang="en-US"/>
           </a:p>
@@ -5623,7 +5623,7 @@
           <a:p>
             <a:fld id="{CE81AE5B-AA08-4C55-A0DF-4A11A5556E1A}" type="datetimeFigureOut">
               <a:rPr lang="en-US" smtClean="0"/>
-              <a:t>9/19/2016</a:t>
+              <a:t>9/20/2016</a:t>
             </a:fld>
             <a:endParaRPr lang="en-US"/>
           </a:p>
@@ -6092,7 +6092,7 @@
           <a:p>
             <a:fld id="{CE81AE5B-AA08-4C55-A0DF-4A11A5556E1A}" type="datetimeFigureOut">
               <a:rPr lang="en-US" smtClean="0"/>
-              <a:t>9/19/2016</a:t>
+              <a:t>9/20/2016</a:t>
             </a:fld>
             <a:endParaRPr lang="en-US"/>
           </a:p>
@@ -7867,8 +7867,19 @@
             </a:r>
             <a:r>
               <a:rPr lang="en-US" dirty="0" smtClean="0"/>
-              <a:t> Multithreading</a:t>
-            </a:r>
+              <a:t> </a:t>
+            </a:r>
+            <a:r>
+              <a:rPr lang="en-US" dirty="0" smtClean="0"/>
+              <a:t>Multithreading</a:t>
+            </a:r>
+          </a:p>
+          <a:p>
+            <a:r>
+              <a:rPr lang="en-US" dirty="0" err="1" smtClean="0"/>
+              <a:t>QThread</a:t>
+            </a:r>
+            <a:endParaRPr lang="en-US" dirty="0" smtClean="0"/>
           </a:p>
           <a:p>
             <a:r>
@@ -8001,15 +8012,7 @@
           <a:p>
             <a:r>
               <a:rPr lang="en-US" dirty="0" smtClean="0"/>
-              <a:t>Provides </a:t>
-            </a:r>
-            <a:r>
-              <a:rPr lang="en-US" dirty="0" smtClean="0"/>
-              <a:t>custom C++ extensions to easily develop code for multiple </a:t>
-            </a:r>
-            <a:r>
-              <a:rPr lang="en-US" dirty="0" smtClean="0"/>
-              <a:t>platforms</a:t>
+              <a:t>Provides custom C++ extensions to easily develop code for multiple platforms</a:t>
             </a:r>
           </a:p>
           <a:p>
@@ -8021,7 +8024,6 @@
               <a:rPr lang="en-US" dirty="0" smtClean="0"/>
               <a:t>1994</a:t>
             </a:r>
-            <a:endParaRPr lang="en-US" dirty="0" smtClean="0"/>
           </a:p>
           <a:p>
             <a:r>
@@ -8150,13 +8152,8 @@
           <a:p>
             <a:r>
               <a:rPr lang="en-US" dirty="0" smtClean="0"/>
-              <a:t>Each technology is at a different level of </a:t>
-            </a:r>
-            <a:r>
-              <a:rPr lang="en-US" dirty="0" smtClean="0"/>
-              <a:t>abstraction</a:t>
-            </a:r>
-            <a:endParaRPr lang="en-US" dirty="0" smtClean="0"/>
+              <a:t>Each technology is at a different level of abstraction</a:t>
+            </a:r>
           </a:p>
           <a:p>
             <a:endParaRPr lang="en-US" dirty="0"/>
@@ -8535,15 +8532,7 @@
           <a:p>
             <a:r>
               <a:rPr lang="en-US" dirty="0" smtClean="0"/>
-              <a:t>In time critical programming, this power and flexibility </a:t>
-            </a:r>
-            <a:r>
-              <a:rPr lang="en-US" dirty="0" smtClean="0"/>
-              <a:t>is vital </a:t>
-            </a:r>
-            <a:r>
-              <a:rPr lang="en-US" dirty="0" smtClean="0"/>
-              <a:t>to taking advantage of </a:t>
+              <a:t>In time critical programming, this power and flexibility is vital to taking advantage of </a:t>
             </a:r>
             <a:r>
               <a:rPr lang="en-US" dirty="0" err="1" smtClean="0"/>
@@ -8551,11 +8540,7 @@
             </a:r>
             <a:r>
               <a:rPr lang="en-US" dirty="0" smtClean="0"/>
-              <a:t> multithreading </a:t>
-            </a:r>
-            <a:r>
-              <a:rPr lang="en-US" dirty="0" smtClean="0"/>
-              <a:t>ability</a:t>
+              <a:t> multithreading ability</a:t>
             </a:r>
           </a:p>
           <a:p>

</xml_diff>

<commit_message>
Added the example photos into the presentation
</commit_message>
<xml_diff>
--- a/Qt.pptx
+++ b/Qt.pptx
@@ -5,10 +5,10 @@
     <p:sldMasterId id="2147483714" r:id="rId1"/>
   </p:sldMasterIdLst>
   <p:notesMasterIdLst>
-    <p:notesMasterId r:id="rId21"/>
+    <p:notesMasterId r:id="rId30"/>
   </p:notesMasterIdLst>
   <p:handoutMasterIdLst>
-    <p:handoutMasterId r:id="rId22"/>
+    <p:handoutMasterId r:id="rId31"/>
   </p:handoutMasterIdLst>
   <p:sldIdLst>
     <p:sldId id="256" r:id="rId2"/>
@@ -19,17 +19,26 @@
     <p:sldId id="264" r:id="rId7"/>
     <p:sldId id="265" r:id="rId8"/>
     <p:sldId id="266" r:id="rId9"/>
-    <p:sldId id="267" r:id="rId10"/>
-    <p:sldId id="268" r:id="rId11"/>
-    <p:sldId id="269" r:id="rId12"/>
-    <p:sldId id="270" r:id="rId13"/>
-    <p:sldId id="260" r:id="rId14"/>
-    <p:sldId id="271" r:id="rId15"/>
-    <p:sldId id="273" r:id="rId16"/>
-    <p:sldId id="272" r:id="rId17"/>
-    <p:sldId id="274" r:id="rId18"/>
-    <p:sldId id="261" r:id="rId19"/>
-    <p:sldId id="263" r:id="rId20"/>
+    <p:sldId id="269" r:id="rId10"/>
+    <p:sldId id="270" r:id="rId11"/>
+    <p:sldId id="275" r:id="rId12"/>
+    <p:sldId id="267" r:id="rId13"/>
+    <p:sldId id="268" r:id="rId14"/>
+    <p:sldId id="276" r:id="rId15"/>
+    <p:sldId id="260" r:id="rId16"/>
+    <p:sldId id="271" r:id="rId17"/>
+    <p:sldId id="273" r:id="rId18"/>
+    <p:sldId id="277" r:id="rId19"/>
+    <p:sldId id="278" r:id="rId20"/>
+    <p:sldId id="272" r:id="rId21"/>
+    <p:sldId id="274" r:id="rId22"/>
+    <p:sldId id="279" r:id="rId23"/>
+    <p:sldId id="280" r:id="rId24"/>
+    <p:sldId id="261" r:id="rId25"/>
+    <p:sldId id="281" r:id="rId26"/>
+    <p:sldId id="282" r:id="rId27"/>
+    <p:sldId id="283" r:id="rId28"/>
+    <p:sldId id="263" r:id="rId29"/>
   </p:sldIdLst>
   <p:sldSz cx="12192000" cy="6858000"/>
   <p:notesSz cx="6858000" cy="9144000"/>
@@ -218,7 +227,7 @@
           <a:p>
             <a:fld id="{61A71368-9B8A-42D5-8701-A40D436A10D8}" type="datetimeFigureOut">
               <a:rPr lang="en-US" smtClean="0"/>
-              <a:t>9/20/2016</a:t>
+              <a:t>9/21/2016</a:t>
             </a:fld>
             <a:endParaRPr lang="en-US"/>
           </a:p>
@@ -384,7 +393,7 @@
           <a:p>
             <a:fld id="{E142B152-94EB-4A13-9545-4406A5E40B02}" type="datetimeFigureOut">
               <a:rPr lang="en-US" smtClean="0"/>
-              <a:t>9/20/2016</a:t>
+              <a:t>9/21/2016</a:t>
             </a:fld>
             <a:endParaRPr lang="en-US"/>
           </a:p>
@@ -836,7 +845,7 @@
           <a:p>
             <a:fld id="{CE81AE5B-AA08-4C55-A0DF-4A11A5556E1A}" type="datetimeFigureOut">
               <a:rPr lang="en-US" smtClean="0"/>
-              <a:t>9/20/2016</a:t>
+              <a:t>9/21/2016</a:t>
             </a:fld>
             <a:endParaRPr lang="en-US"/>
           </a:p>
@@ -1111,7 +1120,7 @@
           <a:p>
             <a:fld id="{CE81AE5B-AA08-4C55-A0DF-4A11A5556E1A}" type="datetimeFigureOut">
               <a:rPr lang="en-US" smtClean="0"/>
-              <a:t>9/20/2016</a:t>
+              <a:t>9/21/2016</a:t>
             </a:fld>
             <a:endParaRPr lang="en-US"/>
           </a:p>
@@ -1305,7 +1314,7 @@
           <a:p>
             <a:fld id="{CE81AE5B-AA08-4C55-A0DF-4A11A5556E1A}" type="datetimeFigureOut">
               <a:rPr lang="en-US" smtClean="0"/>
-              <a:t>9/20/2016</a:t>
+              <a:t>9/21/2016</a:t>
             </a:fld>
             <a:endParaRPr lang="en-US"/>
           </a:p>
@@ -1573,7 +1582,7 @@
           <a:p>
             <a:fld id="{CE81AE5B-AA08-4C55-A0DF-4A11A5556E1A}" type="datetimeFigureOut">
               <a:rPr lang="en-US" smtClean="0"/>
-              <a:t>9/20/2016</a:t>
+              <a:t>9/21/2016</a:t>
             </a:fld>
             <a:endParaRPr lang="en-US"/>
           </a:p>
@@ -1905,7 +1914,7 @@
           <a:p>
             <a:fld id="{CE81AE5B-AA08-4C55-A0DF-4A11A5556E1A}" type="datetimeFigureOut">
               <a:rPr lang="en-US" smtClean="0"/>
-              <a:t>9/20/2016</a:t>
+              <a:t>9/21/2016</a:t>
             </a:fld>
             <a:endParaRPr lang="en-US"/>
           </a:p>
@@ -2515,7 +2524,7 @@
           <a:p>
             <a:fld id="{CE81AE5B-AA08-4C55-A0DF-4A11A5556E1A}" type="datetimeFigureOut">
               <a:rPr lang="en-US" smtClean="0"/>
-              <a:t>9/20/2016</a:t>
+              <a:t>9/21/2016</a:t>
             </a:fld>
             <a:endParaRPr lang="en-US"/>
           </a:p>
@@ -3362,7 +3371,7 @@
           <a:p>
             <a:fld id="{CE81AE5B-AA08-4C55-A0DF-4A11A5556E1A}" type="datetimeFigureOut">
               <a:rPr lang="en-US" smtClean="0"/>
-              <a:t>9/20/2016</a:t>
+              <a:t>9/21/2016</a:t>
             </a:fld>
             <a:endParaRPr lang="en-US"/>
           </a:p>
@@ -3532,7 +3541,7 @@
           <a:p>
             <a:fld id="{CE81AE5B-AA08-4C55-A0DF-4A11A5556E1A}" type="datetimeFigureOut">
               <a:rPr lang="en-US" smtClean="0"/>
-              <a:t>9/20/2016</a:t>
+              <a:t>9/21/2016</a:t>
             </a:fld>
             <a:endParaRPr lang="en-US"/>
           </a:p>
@@ -3712,7 +3721,7 @@
           <a:p>
             <a:fld id="{CE81AE5B-AA08-4C55-A0DF-4A11A5556E1A}" type="datetimeFigureOut">
               <a:rPr lang="en-US" smtClean="0"/>
-              <a:t>9/20/2016</a:t>
+              <a:t>9/21/2016</a:t>
             </a:fld>
             <a:endParaRPr lang="en-US"/>
           </a:p>
@@ -3882,7 +3891,7 @@
           <a:p>
             <a:fld id="{CE81AE5B-AA08-4C55-A0DF-4A11A5556E1A}" type="datetimeFigureOut">
               <a:rPr lang="en-US" smtClean="0"/>
-              <a:t>9/20/2016</a:t>
+              <a:t>9/21/2016</a:t>
             </a:fld>
             <a:endParaRPr lang="en-US"/>
           </a:p>
@@ -4126,7 +4135,7 @@
           <a:p>
             <a:fld id="{CE81AE5B-AA08-4C55-A0DF-4A11A5556E1A}" type="datetimeFigureOut">
               <a:rPr lang="en-US" smtClean="0"/>
-              <a:t>9/20/2016</a:t>
+              <a:t>9/21/2016</a:t>
             </a:fld>
             <a:endParaRPr lang="en-US"/>
           </a:p>
@@ -4418,7 +4427,7 @@
           <a:p>
             <a:fld id="{CE81AE5B-AA08-4C55-A0DF-4A11A5556E1A}" type="datetimeFigureOut">
               <a:rPr lang="en-US" smtClean="0"/>
-              <a:t>9/20/2016</a:t>
+              <a:t>9/21/2016</a:t>
             </a:fld>
             <a:endParaRPr lang="en-US"/>
           </a:p>
@@ -4856,7 +4865,7 @@
           <a:p>
             <a:fld id="{CE81AE5B-AA08-4C55-A0DF-4A11A5556E1A}" type="datetimeFigureOut">
               <a:rPr lang="en-US" smtClean="0"/>
-              <a:t>9/20/2016</a:t>
+              <a:t>9/21/2016</a:t>
             </a:fld>
             <a:endParaRPr lang="en-US"/>
           </a:p>
@@ -4974,7 +4983,7 @@
           <a:p>
             <a:fld id="{CE81AE5B-AA08-4C55-A0DF-4A11A5556E1A}" type="datetimeFigureOut">
               <a:rPr lang="en-US" smtClean="0"/>
-              <a:t>9/20/2016</a:t>
+              <a:t>9/21/2016</a:t>
             </a:fld>
             <a:endParaRPr lang="en-US"/>
           </a:p>
@@ -5069,7 +5078,7 @@
           <a:p>
             <a:fld id="{CE81AE5B-AA08-4C55-A0DF-4A11A5556E1A}" type="datetimeFigureOut">
               <a:rPr lang="en-US" smtClean="0"/>
-              <a:t>9/20/2016</a:t>
+              <a:t>9/21/2016</a:t>
             </a:fld>
             <a:endParaRPr lang="en-US"/>
           </a:p>
@@ -5348,7 +5357,7 @@
           <a:p>
             <a:fld id="{CE81AE5B-AA08-4C55-A0DF-4A11A5556E1A}" type="datetimeFigureOut">
               <a:rPr lang="en-US" smtClean="0"/>
-              <a:t>9/20/2016</a:t>
+              <a:t>9/21/2016</a:t>
             </a:fld>
             <a:endParaRPr lang="en-US"/>
           </a:p>
@@ -5623,7 +5632,7 @@
           <a:p>
             <a:fld id="{CE81AE5B-AA08-4C55-A0DF-4A11A5556E1A}" type="datetimeFigureOut">
               <a:rPr lang="en-US" smtClean="0"/>
-              <a:t>9/20/2016</a:t>
+              <a:t>9/21/2016</a:t>
             </a:fld>
             <a:endParaRPr lang="en-US"/>
           </a:p>
@@ -6092,7 +6101,7 @@
           <a:p>
             <a:fld id="{CE81AE5B-AA08-4C55-A0DF-4A11A5556E1A}" type="datetimeFigureOut">
               <a:rPr lang="en-US" smtClean="0"/>
-              <a:t>9/20/2016</a:t>
+              <a:t>9/21/2016</a:t>
             </a:fld>
             <a:endParaRPr lang="en-US"/>
           </a:p>
@@ -6688,38 +6697,55 @@
               <a:t>Example: </a:t>
             </a:r>
             <a:r>
-              <a:rPr lang="en-US" dirty="0"/>
-              <a:t>Worker </a:t>
-            </a:r>
-            <a:r>
-              <a:rPr lang="en-US" dirty="0" err="1"/>
-              <a:t>QObjects</a:t>
-            </a:r>
-            <a:r>
-              <a:rPr lang="en-US" dirty="0"/>
-              <a:t> on a </a:t>
-            </a:r>
-            <a:r>
-              <a:rPr lang="en-US" dirty="0" err="1"/>
+              <a:rPr lang="en-US" dirty="0" err="1" smtClean="0"/>
               <a:t>QThread</a:t>
             </a:r>
             <a:r>
               <a:rPr lang="en-US" dirty="0" smtClean="0"/>
-              <a:t> </a:t>
+              <a:t> Subclass</a:t>
             </a:r>
             <a:endParaRPr lang="en-US" dirty="0"/>
           </a:p>
         </p:txBody>
       </p:sp>
-      <p:sp>
-        <p:nvSpPr>
-          <p:cNvPr id="3" name="Content Placeholder 2"/>
-          <p:cNvSpPr>
-            <a:spLocks noGrp="1"/>
-          </p:cNvSpPr>
+      <p:pic>
+        <p:nvPicPr>
+          <p:cNvPr id="5" name="Content Placeholder 4"/>
+          <p:cNvPicPr>
+            <a:picLocks noGrp="1" noChangeAspect="1"/>
+          </p:cNvPicPr>
           <p:nvPr>
             <p:ph idx="1"/>
           </p:nvPr>
+        </p:nvPicPr>
+        <p:blipFill>
+          <a:blip r:embed="rId2">
+            <a:extLst>
+              <a:ext uri="{28A0092B-C50C-407E-A947-70E740481C1C}">
+                <a14:useLocalDpi xmlns:a14="http://schemas.microsoft.com/office/drawing/2010/main" val="0"/>
+              </a:ext>
+            </a:extLst>
+          </a:blip>
+          <a:stretch>
+            <a:fillRect/>
+          </a:stretch>
+        </p:blipFill>
+        <p:spPr>
+          <a:xfrm>
+            <a:off x="1313820" y="1416830"/>
+            <a:ext cx="4341525" cy="5093540"/>
+          </a:xfrm>
+        </p:spPr>
+      </p:pic>
+      <p:sp>
+        <p:nvSpPr>
+          <p:cNvPr id="4" name="Footer Placeholder 3"/>
+          <p:cNvSpPr>
+            <a:spLocks noGrp="1"/>
+          </p:cNvSpPr>
+          <p:nvPr>
+            <p:ph type="ftr" sz="quarter" idx="11"/>
+          </p:nvPr>
         </p:nvSpPr>
         <p:spPr/>
         <p:txBody>
@@ -6730,29 +6756,40 @@
           </a:p>
         </p:txBody>
       </p:sp>
-      <p:sp>
-        <p:nvSpPr>
-          <p:cNvPr id="4" name="Footer Placeholder 3"/>
-          <p:cNvSpPr>
-            <a:spLocks noGrp="1"/>
-          </p:cNvSpPr>
-          <p:nvPr>
-            <p:ph type="ftr" sz="quarter" idx="11"/>
-          </p:nvPr>
-        </p:nvSpPr>
-        <p:spPr/>
-        <p:txBody>
-          <a:bodyPr/>
-          <a:lstStyle/>
-          <a:p>
-            <a:endParaRPr lang="en-US"/>
-          </a:p>
-        </p:txBody>
-      </p:sp>
+      <p:pic>
+        <p:nvPicPr>
+          <p:cNvPr id="6" name="Picture 5"/>
+          <p:cNvPicPr>
+            <a:picLocks noChangeAspect="1"/>
+          </p:cNvPicPr>
+          <p:nvPr/>
+        </p:nvPicPr>
+        <p:blipFill>
+          <a:blip r:embed="rId3">
+            <a:extLst>
+              <a:ext uri="{28A0092B-C50C-407E-A947-70E740481C1C}">
+                <a14:useLocalDpi xmlns:a14="http://schemas.microsoft.com/office/drawing/2010/main" val="0"/>
+              </a:ext>
+            </a:extLst>
+          </a:blip>
+          <a:stretch>
+            <a:fillRect/>
+          </a:stretch>
+        </p:blipFill>
+        <p:spPr>
+          <a:xfrm>
+            <a:off x="6451564" y="1416830"/>
+            <a:ext cx="4980805" cy="5093540"/>
+          </a:xfrm>
+          <a:prstGeom prst="rect">
+            <a:avLst/>
+          </a:prstGeom>
+        </p:spPr>
+      </p:pic>
     </p:spTree>
     <p:extLst>
       <p:ext uri="{BB962C8B-B14F-4D97-AF65-F5344CB8AC3E}">
-        <p14:creationId xmlns:p14="http://schemas.microsoft.com/office/powerpoint/2010/main" val="1904361491"/>
+        <p14:creationId xmlns:p14="http://schemas.microsoft.com/office/powerpoint/2010/main" val="3732503962"/>
       </p:ext>
     </p:extLst>
   </p:cSld>
@@ -6802,84 +6839,57 @@
           <a:lstStyle/>
           <a:p>
             <a:r>
-              <a:rPr lang="en-US" dirty="0" err="1" smtClean="0"/>
+              <a:rPr lang="en-US" dirty="0"/>
+              <a:t>Example: </a:t>
+            </a:r>
+            <a:r>
+              <a:rPr lang="en-US" dirty="0" err="1"/>
               <a:t>QThread</a:t>
             </a:r>
             <a:r>
+              <a:rPr lang="en-US" dirty="0"/>
+              <a:t> </a:t>
+            </a:r>
+            <a:r>
               <a:rPr lang="en-US" dirty="0" smtClean="0"/>
-              <a:t> Subclass</a:t>
+              <a:t>Subclass (Cont.)</a:t>
             </a:r>
             <a:endParaRPr lang="en-US" dirty="0"/>
           </a:p>
         </p:txBody>
       </p:sp>
-      <p:sp>
-        <p:nvSpPr>
-          <p:cNvPr id="3" name="Content Placeholder 2"/>
-          <p:cNvSpPr>
-            <a:spLocks noGrp="1"/>
-          </p:cNvSpPr>
+      <p:pic>
+        <p:nvPicPr>
+          <p:cNvPr id="6" name="Content Placeholder 5"/>
+          <p:cNvPicPr>
+            <a:picLocks noGrp="1" noChangeAspect="1"/>
+          </p:cNvPicPr>
           <p:nvPr>
             <p:ph idx="1"/>
           </p:nvPr>
-        </p:nvSpPr>
-        <p:spPr/>
-        <p:txBody>
-          <a:bodyPr/>
-          <a:lstStyle/>
-          <a:p>
-            <a:r>
-              <a:rPr lang="en-US" dirty="0" smtClean="0"/>
-              <a:t>Create a class that inherits from </a:t>
-            </a:r>
-            <a:r>
-              <a:rPr lang="en-US" dirty="0" err="1" smtClean="0"/>
-              <a:t>QThread</a:t>
-            </a:r>
-            <a:endParaRPr lang="en-US" dirty="0" smtClean="0"/>
-          </a:p>
-          <a:p>
-            <a:r>
-              <a:rPr lang="en-US" dirty="0" smtClean="0"/>
-              <a:t>In the subclass, </a:t>
-            </a:r>
-            <a:r>
-              <a:rPr lang="en-US" dirty="0" err="1" smtClean="0"/>
-              <a:t>reimplement</a:t>
-            </a:r>
-            <a:r>
-              <a:rPr lang="en-US" dirty="0" smtClean="0"/>
-              <a:t> </a:t>
-            </a:r>
-            <a:r>
-              <a:rPr lang="en-US" dirty="0" err="1" smtClean="0"/>
-              <a:t>QThread’s</a:t>
-            </a:r>
-            <a:r>
-              <a:rPr lang="en-US" dirty="0" smtClean="0"/>
-              <a:t> run() function</a:t>
-            </a:r>
-          </a:p>
-          <a:p>
-            <a:r>
-              <a:rPr lang="en-US" dirty="0" smtClean="0"/>
-              <a:t>Now, when you start your </a:t>
-            </a:r>
-            <a:r>
-              <a:rPr lang="en-US" dirty="0" err="1" smtClean="0"/>
-              <a:t>QThread</a:t>
-            </a:r>
-            <a:r>
-              <a:rPr lang="en-US" dirty="0" smtClean="0"/>
-              <a:t> subclass, the functionality implemented in the run() function will execute on your new thread</a:t>
-            </a:r>
-            <a:endParaRPr lang="en-US" dirty="0"/>
-          </a:p>
-        </p:txBody>
-      </p:sp>
-      <p:sp>
-        <p:nvSpPr>
-          <p:cNvPr id="4" name="Footer Placeholder 3"/>
+        </p:nvPicPr>
+        <p:blipFill>
+          <a:blip r:embed="rId2">
+            <a:extLst>
+              <a:ext uri="{28A0092B-C50C-407E-A947-70E740481C1C}">
+                <a14:useLocalDpi xmlns:a14="http://schemas.microsoft.com/office/drawing/2010/main" val="0"/>
+              </a:ext>
+            </a:extLst>
+          </a:blip>
+          <a:stretch>
+            <a:fillRect/>
+          </a:stretch>
+        </p:blipFill>
+        <p:spPr>
+          <a:xfrm>
+            <a:off x="3963129" y="1963883"/>
+            <a:ext cx="4265742" cy="3746297"/>
+          </a:xfrm>
+        </p:spPr>
+      </p:pic>
+      <p:sp>
+        <p:nvSpPr>
+          <p:cNvPr id="7" name="Footer Placeholder 6"/>
           <p:cNvSpPr>
             <a:spLocks noGrp="1"/>
           </p:cNvSpPr>
@@ -6899,7 +6909,7 @@
     </p:spTree>
     <p:extLst>
       <p:ext uri="{BB962C8B-B14F-4D97-AF65-F5344CB8AC3E}">
-        <p14:creationId xmlns:p14="http://schemas.microsoft.com/office/powerpoint/2010/main" val="506777878"/>
+        <p14:creationId xmlns:p14="http://schemas.microsoft.com/office/powerpoint/2010/main" val="3638593845"/>
       </p:ext>
     </p:extLst>
   </p:cSld>
@@ -6950,36 +6960,101 @@
           <a:p>
             <a:r>
               <a:rPr lang="en-US" dirty="0" smtClean="0"/>
-              <a:t>Example: </a:t>
+              <a:t>Worker </a:t>
+            </a:r>
+            <a:r>
+              <a:rPr lang="en-US" dirty="0" err="1" smtClean="0"/>
+              <a:t>QObjects</a:t>
+            </a:r>
+            <a:r>
+              <a:rPr lang="en-US" dirty="0" smtClean="0"/>
+              <a:t> on a </a:t>
             </a:r>
             <a:r>
               <a:rPr lang="en-US" dirty="0" err="1" smtClean="0"/>
               <a:t>QThread</a:t>
             </a:r>
+            <a:endParaRPr lang="en-US" dirty="0"/>
+          </a:p>
+        </p:txBody>
+      </p:sp>
+      <p:sp>
+        <p:nvSpPr>
+          <p:cNvPr id="3" name="Content Placeholder 2"/>
+          <p:cNvSpPr>
+            <a:spLocks noGrp="1"/>
+          </p:cNvSpPr>
+          <p:nvPr>
+            <p:ph idx="1"/>
+          </p:nvPr>
+        </p:nvSpPr>
+        <p:spPr/>
+        <p:txBody>
+          <a:bodyPr/>
+          <a:lstStyle/>
+          <a:p>
             <a:r>
               <a:rPr lang="en-US" dirty="0" smtClean="0"/>
-              <a:t> Subclass</a:t>
+              <a:t>Create classes that inherit from </a:t>
+            </a:r>
+            <a:r>
+              <a:rPr lang="en-US" dirty="0" err="1" smtClean="0"/>
+              <a:t>QOjbect</a:t>
+            </a:r>
+            <a:r>
+              <a:rPr lang="en-US" dirty="0" smtClean="0"/>
+              <a:t> to act as worker object’s on your </a:t>
+            </a:r>
+            <a:r>
+              <a:rPr lang="en-US" dirty="0" err="1" smtClean="0"/>
+              <a:t>QThread</a:t>
             </a:r>
             <a:endParaRPr lang="en-US" dirty="0"/>
           </a:p>
-        </p:txBody>
-      </p:sp>
-      <p:sp>
-        <p:nvSpPr>
-          <p:cNvPr id="3" name="Content Placeholder 2"/>
-          <p:cNvSpPr>
-            <a:spLocks noGrp="1"/>
-          </p:cNvSpPr>
-          <p:nvPr>
-            <p:ph idx="1"/>
-          </p:nvPr>
-        </p:nvSpPr>
-        <p:spPr/>
-        <p:txBody>
-          <a:bodyPr/>
-          <a:lstStyle/>
-          <a:p>
-            <a:endParaRPr lang="en-US"/>
+          <a:p>
+            <a:r>
+              <a:rPr lang="en-US" dirty="0" smtClean="0"/>
+              <a:t>Move thread to your </a:t>
+            </a:r>
+            <a:r>
+              <a:rPr lang="en-US" dirty="0" err="1" smtClean="0"/>
+              <a:t>Qthread</a:t>
+            </a:r>
+            <a:r>
+              <a:rPr lang="en-US" dirty="0" smtClean="0"/>
+              <a:t> with the </a:t>
+            </a:r>
+            <a:r>
+              <a:rPr lang="en-US" dirty="0" err="1" smtClean="0"/>
+              <a:t>QOjbect</a:t>
+            </a:r>
+            <a:r>
+              <a:rPr lang="en-US" dirty="0" smtClean="0"/>
+              <a:t>::</a:t>
+            </a:r>
+            <a:r>
+              <a:rPr lang="en-US" dirty="0" err="1" smtClean="0"/>
+              <a:t>moveToThread</a:t>
+            </a:r>
+            <a:r>
+              <a:rPr lang="en-US" dirty="0" smtClean="0"/>
+              <a:t>() function</a:t>
+            </a:r>
+          </a:p>
+          <a:p>
+            <a:r>
+              <a:rPr lang="en-US" dirty="0" smtClean="0"/>
+              <a:t>Interact with you new worker objects on different threads using </a:t>
+            </a:r>
+            <a:r>
+              <a:rPr lang="en-US" dirty="0" err="1" smtClean="0"/>
+              <a:t>Qt’s</a:t>
+            </a:r>
+            <a:r>
+              <a:rPr lang="en-US" dirty="0" smtClean="0"/>
+              <a:t> Signals and Slots</a:t>
+            </a:r>
+            <a:endParaRPr lang="en-US" dirty="0"/>
           </a:p>
         </p:txBody>
       </p:sp>
@@ -7005,7 +7080,7 @@
     </p:spTree>
     <p:extLst>
       <p:ext uri="{BB962C8B-B14F-4D97-AF65-F5344CB8AC3E}">
-        <p14:creationId xmlns:p14="http://schemas.microsoft.com/office/powerpoint/2010/main" val="3732503962"/>
+        <p14:creationId xmlns:p14="http://schemas.microsoft.com/office/powerpoint/2010/main" val="419392018"/>
       </p:ext>
     </p:extLst>
   </p:cSld>
@@ -7056,7 +7131,27 @@
           <a:p>
             <a:r>
               <a:rPr lang="en-US" dirty="0" smtClean="0"/>
-              <a:t>Signals and Slots</a:t>
+              <a:t>Example: </a:t>
+            </a:r>
+            <a:r>
+              <a:rPr lang="en-US" dirty="0"/>
+              <a:t>Worker </a:t>
+            </a:r>
+            <a:r>
+              <a:rPr lang="en-US" dirty="0" err="1"/>
+              <a:t>QObjects</a:t>
+            </a:r>
+            <a:r>
+              <a:rPr lang="en-US" dirty="0"/>
+              <a:t> on a </a:t>
+            </a:r>
+            <a:r>
+              <a:rPr lang="en-US" dirty="0" err="1"/>
+              <a:t>QThread</a:t>
+            </a:r>
+            <a:r>
+              <a:rPr lang="en-US" dirty="0" smtClean="0"/>
+              <a:t> </a:t>
             </a:r>
             <a:endParaRPr lang="en-US" dirty="0"/>
           </a:p>
@@ -7064,75 +7159,86 @@
       </p:sp>
       <p:sp>
         <p:nvSpPr>
-          <p:cNvPr id="3" name="Content Placeholder 2"/>
-          <p:cNvSpPr>
-            <a:spLocks noGrp="1"/>
-          </p:cNvSpPr>
+          <p:cNvPr id="4" name="Footer Placeholder 3"/>
+          <p:cNvSpPr>
+            <a:spLocks noGrp="1"/>
+          </p:cNvSpPr>
+          <p:nvPr>
+            <p:ph type="ftr" sz="quarter" idx="11"/>
+          </p:nvPr>
+        </p:nvSpPr>
+        <p:spPr/>
+        <p:txBody>
+          <a:bodyPr/>
+          <a:lstStyle/>
+          <a:p>
+            <a:endParaRPr lang="en-US" dirty="0"/>
+          </a:p>
+        </p:txBody>
+      </p:sp>
+      <p:pic>
+        <p:nvPicPr>
+          <p:cNvPr id="7" name="Content Placeholder 6"/>
+          <p:cNvPicPr>
+            <a:picLocks noGrp="1" noChangeAspect="1"/>
+          </p:cNvPicPr>
           <p:nvPr>
             <p:ph idx="1"/>
           </p:nvPr>
-        </p:nvSpPr>
-        <p:spPr/>
-        <p:txBody>
-          <a:bodyPr/>
-          <a:lstStyle/>
-          <a:p>
-            <a:r>
-              <a:rPr lang="en-US" dirty="0" err="1" smtClean="0"/>
-              <a:t>Qt’s</a:t>
-            </a:r>
-            <a:r>
-              <a:rPr lang="en-US" dirty="0" smtClean="0"/>
-              <a:t> Signals and Slots are used to facilitate communication between objects</a:t>
-            </a:r>
-          </a:p>
-          <a:p>
-            <a:r>
-              <a:rPr lang="en-US" dirty="0"/>
-              <a:t>Signals are emitted and handled by the connected </a:t>
-            </a:r>
-            <a:r>
-              <a:rPr lang="en-US" dirty="0" smtClean="0"/>
-              <a:t>Slots</a:t>
-            </a:r>
-          </a:p>
-          <a:p>
-            <a:r>
-              <a:rPr lang="en-US" dirty="0" smtClean="0"/>
-              <a:t>Direct connection vs. Queued connection</a:t>
-            </a:r>
-          </a:p>
-          <a:p>
-            <a:r>
-              <a:rPr lang="en-US" dirty="0" smtClean="0"/>
-              <a:t>It is a simple solution to manage communication between different threads of execution</a:t>
-            </a:r>
-          </a:p>
-        </p:txBody>
-      </p:sp>
-      <p:sp>
-        <p:nvSpPr>
-          <p:cNvPr id="4" name="Footer Placeholder 3"/>
-          <p:cNvSpPr>
-            <a:spLocks noGrp="1"/>
-          </p:cNvSpPr>
-          <p:nvPr>
-            <p:ph type="ftr" sz="quarter" idx="11"/>
-          </p:nvPr>
-        </p:nvSpPr>
-        <p:spPr/>
-        <p:txBody>
-          <a:bodyPr/>
-          <a:lstStyle/>
-          <a:p>
-            <a:endParaRPr lang="en-US"/>
-          </a:p>
-        </p:txBody>
-      </p:sp>
+        </p:nvPicPr>
+        <p:blipFill>
+          <a:blip r:embed="rId2">
+            <a:extLst>
+              <a:ext uri="{28A0092B-C50C-407E-A947-70E740481C1C}">
+                <a14:useLocalDpi xmlns:a14="http://schemas.microsoft.com/office/drawing/2010/main" val="0"/>
+              </a:ext>
+            </a:extLst>
+          </a:blip>
+          <a:stretch>
+            <a:fillRect/>
+          </a:stretch>
+        </p:blipFill>
+        <p:spPr>
+          <a:xfrm>
+            <a:off x="981131" y="1853247"/>
+            <a:ext cx="4739932" cy="4730781"/>
+          </a:xfrm>
+        </p:spPr>
+      </p:pic>
+      <p:pic>
+        <p:nvPicPr>
+          <p:cNvPr id="8" name="Picture 7"/>
+          <p:cNvPicPr>
+            <a:picLocks noChangeAspect="1"/>
+          </p:cNvPicPr>
+          <p:nvPr/>
+        </p:nvPicPr>
+        <p:blipFill>
+          <a:blip r:embed="rId3">
+            <a:extLst>
+              <a:ext uri="{28A0092B-C50C-407E-A947-70E740481C1C}">
+                <a14:useLocalDpi xmlns:a14="http://schemas.microsoft.com/office/drawing/2010/main" val="0"/>
+              </a:ext>
+            </a:extLst>
+          </a:blip>
+          <a:stretch>
+            <a:fillRect/>
+          </a:stretch>
+        </p:blipFill>
+        <p:spPr>
+          <a:xfrm>
+            <a:off x="6947527" y="1240797"/>
+            <a:ext cx="3942146" cy="5420450"/>
+          </a:xfrm>
+          <a:prstGeom prst="rect">
+            <a:avLst/>
+          </a:prstGeom>
+        </p:spPr>
+      </p:pic>
     </p:spTree>
     <p:extLst>
       <p:ext uri="{BB962C8B-B14F-4D97-AF65-F5344CB8AC3E}">
-        <p14:creationId xmlns:p14="http://schemas.microsoft.com/office/powerpoint/2010/main" val="823664890"/>
+        <p14:creationId xmlns:p14="http://schemas.microsoft.com/office/powerpoint/2010/main" val="1904361491"/>
       </p:ext>
     </p:extLst>
   </p:cSld>
@@ -7182,51 +7288,65 @@
           <a:lstStyle/>
           <a:p>
             <a:r>
+              <a:rPr lang="en-US" dirty="0"/>
+              <a:t>Example: Worker </a:t>
+            </a:r>
+            <a:r>
+              <a:rPr lang="en-US" dirty="0" err="1"/>
+              <a:t>QObjects</a:t>
+            </a:r>
+            <a:r>
+              <a:rPr lang="en-US" dirty="0"/>
+              <a:t> on a </a:t>
+            </a:r>
+            <a:r>
+              <a:rPr lang="en-US" dirty="0" err="1"/>
+              <a:t>QThread</a:t>
+            </a:r>
+            <a:r>
+              <a:rPr lang="en-US" dirty="0"/>
+              <a:t> </a:t>
+            </a:r>
+            <a:r>
               <a:rPr lang="en-US" dirty="0" smtClean="0"/>
-              <a:t>Direct Connection</a:t>
+              <a:t>(Cont.)</a:t>
             </a:r>
             <a:endParaRPr lang="en-US" dirty="0"/>
           </a:p>
         </p:txBody>
       </p:sp>
-      <p:sp>
-        <p:nvSpPr>
-          <p:cNvPr id="3" name="Content Placeholder 2"/>
-          <p:cNvSpPr>
-            <a:spLocks noGrp="1"/>
-          </p:cNvSpPr>
+      <p:pic>
+        <p:nvPicPr>
+          <p:cNvPr id="4" name="Content Placeholder 3"/>
+          <p:cNvPicPr>
+            <a:picLocks noGrp="1" noChangeAspect="1"/>
+          </p:cNvPicPr>
           <p:nvPr>
             <p:ph idx="1"/>
           </p:nvPr>
-        </p:nvSpPr>
-        <p:spPr/>
-        <p:txBody>
-          <a:bodyPr/>
-          <a:lstStyle/>
-          <a:p>
-            <a:r>
-              <a:rPr lang="en-US" dirty="0" smtClean="0"/>
-              <a:t>When a signal is emitted, execution of the slot happens directly after it is called.</a:t>
-            </a:r>
-          </a:p>
-          <a:p>
-            <a:r>
-              <a:rPr lang="en-US" dirty="0" smtClean="0"/>
-              <a:t>Does not change the current execution thread</a:t>
-            </a:r>
-          </a:p>
-          <a:p>
-            <a:r>
-              <a:rPr lang="en-US" dirty="0" smtClean="0"/>
-              <a:t>Behaves like a normal function call</a:t>
-            </a:r>
-            <a:endParaRPr lang="en-US" dirty="0"/>
-          </a:p>
-        </p:txBody>
-      </p:sp>
-      <p:sp>
-        <p:nvSpPr>
-          <p:cNvPr id="4" name="Footer Placeholder 3"/>
+        </p:nvPicPr>
+        <p:blipFill>
+          <a:blip r:embed="rId2">
+            <a:extLst>
+              <a:ext uri="{28A0092B-C50C-407E-A947-70E740481C1C}">
+                <a14:useLocalDpi xmlns:a14="http://schemas.microsoft.com/office/drawing/2010/main" val="0"/>
+              </a:ext>
+            </a:extLst>
+          </a:blip>
+          <a:stretch>
+            <a:fillRect/>
+          </a:stretch>
+        </p:blipFill>
+        <p:spPr>
+          <a:xfrm>
+            <a:off x="3479215" y="2556163"/>
+            <a:ext cx="5233570" cy="2330917"/>
+          </a:xfrm>
+        </p:spPr>
+      </p:pic>
+      <p:sp>
+        <p:nvSpPr>
+          <p:cNvPr id="5" name="Footer Placeholder 4"/>
           <p:cNvSpPr>
             <a:spLocks noGrp="1"/>
           </p:cNvSpPr>
@@ -7246,7 +7366,7 @@
     </p:spTree>
     <p:extLst>
       <p:ext uri="{BB962C8B-B14F-4D97-AF65-F5344CB8AC3E}">
-        <p14:creationId xmlns:p14="http://schemas.microsoft.com/office/powerpoint/2010/main" val="1712268847"/>
+        <p14:creationId xmlns:p14="http://schemas.microsoft.com/office/powerpoint/2010/main" val="3501292117"/>
       </p:ext>
     </p:extLst>
   </p:cSld>
@@ -7297,7 +7417,7 @@
           <a:p>
             <a:r>
               <a:rPr lang="en-US" dirty="0" smtClean="0"/>
-              <a:t>Example: Direct Connection</a:t>
+              <a:t>Signals and Slots</a:t>
             </a:r>
             <a:endParaRPr lang="en-US" dirty="0"/>
           </a:p>
@@ -7318,7 +7438,36 @@
           <a:bodyPr/>
           <a:lstStyle/>
           <a:p>
-            <a:endParaRPr lang="en-US"/>
+            <a:r>
+              <a:rPr lang="en-US" dirty="0" err="1" smtClean="0"/>
+              <a:t>Qt’s</a:t>
+            </a:r>
+            <a:r>
+              <a:rPr lang="en-US" dirty="0" smtClean="0"/>
+              <a:t> Signals and Slots are used to facilitate communication between objects</a:t>
+            </a:r>
+          </a:p>
+          <a:p>
+            <a:r>
+              <a:rPr lang="en-US" dirty="0"/>
+              <a:t>Signals are emitted and handled by the connected </a:t>
+            </a:r>
+            <a:r>
+              <a:rPr lang="en-US" dirty="0" smtClean="0"/>
+              <a:t>Slots</a:t>
+            </a:r>
+          </a:p>
+          <a:p>
+            <a:r>
+              <a:rPr lang="en-US" dirty="0" smtClean="0"/>
+              <a:t>Direct connection vs. Queued connection</a:t>
+            </a:r>
+          </a:p>
+          <a:p>
+            <a:r>
+              <a:rPr lang="en-US" dirty="0" smtClean="0"/>
+              <a:t>It is a simple solution to manage communication between different threads of execution</a:t>
+            </a:r>
           </a:p>
         </p:txBody>
       </p:sp>
@@ -7344,7 +7493,7 @@
     </p:spTree>
     <p:extLst>
       <p:ext uri="{BB962C8B-B14F-4D97-AF65-F5344CB8AC3E}">
-        <p14:creationId xmlns:p14="http://schemas.microsoft.com/office/powerpoint/2010/main" val="1659961544"/>
+        <p14:creationId xmlns:p14="http://schemas.microsoft.com/office/powerpoint/2010/main" val="823664890"/>
       </p:ext>
     </p:extLst>
   </p:cSld>
@@ -7395,7 +7544,7 @@
           <a:p>
             <a:r>
               <a:rPr lang="en-US" dirty="0" smtClean="0"/>
-              <a:t>Queued Connection</a:t>
+              <a:t>Direct Connection</a:t>
             </a:r>
             <a:endParaRPr lang="en-US" dirty="0"/>
           </a:p>
@@ -7418,35 +7567,19 @@
           <a:p>
             <a:r>
               <a:rPr lang="en-US" dirty="0" smtClean="0"/>
-              <a:t>When a signal is emitted, it is placed on the event queue of the </a:t>
-            </a:r>
-            <a:r>
-              <a:rPr lang="en-US" dirty="0" err="1" smtClean="0"/>
-              <a:t>QObject</a:t>
-            </a:r>
-            <a:r>
-              <a:rPr lang="en-US" dirty="0"/>
-              <a:t> </a:t>
-            </a:r>
+              <a:t>When a signal is emitted, execution of the slot happens directly after it is called.</a:t>
+            </a:r>
+          </a:p>
+          <a:p>
             <a:r>
               <a:rPr lang="en-US" dirty="0" smtClean="0"/>
-              <a:t>containing the slot to be executed</a:t>
-            </a:r>
-          </a:p>
-          <a:p>
-            <a:r>
-              <a:rPr lang="en-US" dirty="0"/>
-              <a:t>A</a:t>
-            </a:r>
+              <a:t>Does not change the current execution thread</a:t>
+            </a:r>
+          </a:p>
+          <a:p>
             <a:r>
               <a:rPr lang="en-US" dirty="0" smtClean="0"/>
-              <a:t>fter the signal is emitted, execution of the code after the signal continues.</a:t>
-            </a:r>
-          </a:p>
-          <a:p>
-            <a:r>
-              <a:rPr lang="en-US" dirty="0" smtClean="0"/>
-              <a:t>The slot will be executed when the event is queued up on the corresponding thread</a:t>
+              <a:t>Behaves like a normal function call</a:t>
             </a:r>
             <a:endParaRPr lang="en-US" dirty="0"/>
           </a:p>
@@ -7474,7 +7607,7 @@
     </p:spTree>
     <p:extLst>
       <p:ext uri="{BB962C8B-B14F-4D97-AF65-F5344CB8AC3E}">
-        <p14:creationId xmlns:p14="http://schemas.microsoft.com/office/powerpoint/2010/main" val="1924793217"/>
+        <p14:creationId xmlns:p14="http://schemas.microsoft.com/office/powerpoint/2010/main" val="1712268847"/>
       </p:ext>
     </p:extLst>
   </p:cSld>
@@ -7525,21 +7658,50 @@
           <a:p>
             <a:r>
               <a:rPr lang="en-US" dirty="0" smtClean="0"/>
-              <a:t>Example: Queued Connection</a:t>
+              <a:t>Example: Direct Connection</a:t>
             </a:r>
             <a:endParaRPr lang="en-US" dirty="0"/>
           </a:p>
         </p:txBody>
       </p:sp>
-      <p:sp>
-        <p:nvSpPr>
-          <p:cNvPr id="3" name="Content Placeholder 2"/>
-          <p:cNvSpPr>
-            <a:spLocks noGrp="1"/>
-          </p:cNvSpPr>
+      <p:pic>
+        <p:nvPicPr>
+          <p:cNvPr id="5" name="Content Placeholder 4"/>
+          <p:cNvPicPr>
+            <a:picLocks noGrp="1" noChangeAspect="1"/>
+          </p:cNvPicPr>
           <p:nvPr>
             <p:ph idx="1"/>
           </p:nvPr>
+        </p:nvPicPr>
+        <p:blipFill>
+          <a:blip r:embed="rId2">
+            <a:extLst>
+              <a:ext uri="{28A0092B-C50C-407E-A947-70E740481C1C}">
+                <a14:useLocalDpi xmlns:a14="http://schemas.microsoft.com/office/drawing/2010/main" val="0"/>
+              </a:ext>
+            </a:extLst>
+          </a:blip>
+          <a:stretch>
+            <a:fillRect/>
+          </a:stretch>
+        </p:blipFill>
+        <p:spPr>
+          <a:xfrm>
+            <a:off x="1662792" y="1340760"/>
+            <a:ext cx="3240678" cy="5243269"/>
+          </a:xfrm>
+        </p:spPr>
+      </p:pic>
+      <p:sp>
+        <p:nvSpPr>
+          <p:cNvPr id="4" name="Footer Placeholder 3"/>
+          <p:cNvSpPr>
+            <a:spLocks noGrp="1"/>
+          </p:cNvSpPr>
+          <p:nvPr>
+            <p:ph type="ftr" sz="quarter" idx="11"/>
+          </p:nvPr>
         </p:nvSpPr>
         <p:spPr/>
         <p:txBody>
@@ -7550,29 +7712,40 @@
           </a:p>
         </p:txBody>
       </p:sp>
-      <p:sp>
-        <p:nvSpPr>
-          <p:cNvPr id="4" name="Footer Placeholder 3"/>
-          <p:cNvSpPr>
-            <a:spLocks noGrp="1"/>
-          </p:cNvSpPr>
-          <p:nvPr>
-            <p:ph type="ftr" sz="quarter" idx="11"/>
-          </p:nvPr>
-        </p:nvSpPr>
-        <p:spPr/>
-        <p:txBody>
-          <a:bodyPr/>
-          <a:lstStyle/>
-          <a:p>
-            <a:endParaRPr lang="en-US"/>
-          </a:p>
-        </p:txBody>
-      </p:sp>
+      <p:pic>
+        <p:nvPicPr>
+          <p:cNvPr id="6" name="Picture 5"/>
+          <p:cNvPicPr>
+            <a:picLocks noChangeAspect="1"/>
+          </p:cNvPicPr>
+          <p:nvPr/>
+        </p:nvPicPr>
+        <p:blipFill>
+          <a:blip r:embed="rId3">
+            <a:extLst>
+              <a:ext uri="{28A0092B-C50C-407E-A947-70E740481C1C}">
+                <a14:useLocalDpi xmlns:a14="http://schemas.microsoft.com/office/drawing/2010/main" val="0"/>
+              </a:ext>
+            </a:extLst>
+          </a:blip>
+          <a:stretch>
+            <a:fillRect/>
+          </a:stretch>
+        </p:blipFill>
+        <p:spPr>
+          <a:xfrm>
+            <a:off x="6678635" y="1340760"/>
+            <a:ext cx="4034682" cy="5243269"/>
+          </a:xfrm>
+          <a:prstGeom prst="rect">
+            <a:avLst/>
+          </a:prstGeom>
+        </p:spPr>
+      </p:pic>
     </p:spTree>
     <p:extLst>
       <p:ext uri="{BB962C8B-B14F-4D97-AF65-F5344CB8AC3E}">
-        <p14:creationId xmlns:p14="http://schemas.microsoft.com/office/powerpoint/2010/main" val="1542041918"/>
+        <p14:creationId xmlns:p14="http://schemas.microsoft.com/office/powerpoint/2010/main" val="1659961544"/>
       </p:ext>
     </p:extLst>
   </p:cSld>
@@ -7622,35 +7795,49 @@
           <a:lstStyle/>
           <a:p>
             <a:r>
+              <a:rPr lang="en-US" dirty="0"/>
+              <a:t>Example: Direct </a:t>
+            </a:r>
+            <a:r>
               <a:rPr lang="en-US" dirty="0" smtClean="0"/>
-              <a:t>Examples</a:t>
+              <a:t>Connection (Cont.)</a:t>
             </a:r>
             <a:endParaRPr lang="en-US" dirty="0"/>
           </a:p>
         </p:txBody>
       </p:sp>
-      <p:sp>
-        <p:nvSpPr>
-          <p:cNvPr id="3" name="Content Placeholder 2"/>
-          <p:cNvSpPr>
-            <a:spLocks noGrp="1"/>
-          </p:cNvSpPr>
+      <p:pic>
+        <p:nvPicPr>
+          <p:cNvPr id="4" name="Content Placeholder 3"/>
+          <p:cNvPicPr>
+            <a:picLocks noGrp="1" noChangeAspect="1"/>
+          </p:cNvPicPr>
           <p:nvPr>
             <p:ph idx="1"/>
           </p:nvPr>
-        </p:nvSpPr>
-        <p:spPr/>
-        <p:txBody>
-          <a:bodyPr/>
-          <a:lstStyle/>
-          <a:p>
-            <a:endParaRPr lang="en-US"/>
-          </a:p>
-        </p:txBody>
-      </p:sp>
-      <p:sp>
-        <p:nvSpPr>
-          <p:cNvPr id="4" name="Footer Placeholder 3"/>
+        </p:nvPicPr>
+        <p:blipFill>
+          <a:blip r:embed="rId2">
+            <a:extLst>
+              <a:ext uri="{28A0092B-C50C-407E-A947-70E740481C1C}">
+                <a14:useLocalDpi xmlns:a14="http://schemas.microsoft.com/office/drawing/2010/main" val="0"/>
+              </a:ext>
+            </a:extLst>
+          </a:blip>
+          <a:stretch>
+            <a:fillRect/>
+          </a:stretch>
+        </p:blipFill>
+        <p:spPr>
+          <a:xfrm>
+            <a:off x="4027535" y="1760220"/>
+            <a:ext cx="4136930" cy="4718088"/>
+          </a:xfrm>
+        </p:spPr>
+      </p:pic>
+      <p:sp>
+        <p:nvSpPr>
+          <p:cNvPr id="5" name="Footer Placeholder 4"/>
           <p:cNvSpPr>
             <a:spLocks noGrp="1"/>
           </p:cNvSpPr>
@@ -7670,7 +7857,7 @@
     </p:spTree>
     <p:extLst>
       <p:ext uri="{BB962C8B-B14F-4D97-AF65-F5344CB8AC3E}">
-        <p14:creationId xmlns:p14="http://schemas.microsoft.com/office/powerpoint/2010/main" val="2505696057"/>
+        <p14:creationId xmlns:p14="http://schemas.microsoft.com/office/powerpoint/2010/main" val="415281188"/>
       </p:ext>
     </p:extLst>
   </p:cSld>
@@ -7720,42 +7907,44 @@
           <a:lstStyle/>
           <a:p>
             <a:r>
-              <a:rPr lang="en-US" dirty="0" smtClean="0"/>
-              <a:t>References</a:t>
-            </a:r>
-            <a:endParaRPr lang="en-US" dirty="0"/>
-          </a:p>
-        </p:txBody>
-      </p:sp>
-      <p:sp>
-        <p:nvSpPr>
-          <p:cNvPr id="3" name="Content Placeholder 2"/>
-          <p:cNvSpPr>
-            <a:spLocks noGrp="1"/>
-          </p:cNvSpPr>
+              <a:rPr lang="en-US" dirty="0"/>
+              <a:t>Example: Direct Connection (Cont.)</a:t>
+            </a:r>
+          </a:p>
+        </p:txBody>
+      </p:sp>
+      <p:pic>
+        <p:nvPicPr>
+          <p:cNvPr id="5" name="Content Placeholder 4"/>
+          <p:cNvPicPr>
+            <a:picLocks noGrp="1" noChangeAspect="1"/>
+          </p:cNvPicPr>
           <p:nvPr>
             <p:ph idx="1"/>
           </p:nvPr>
-        </p:nvSpPr>
-        <p:spPr/>
-        <p:txBody>
-          <a:bodyPr/>
-          <a:lstStyle/>
-          <a:p>
-            <a:pPr marL="457200" indent="-457200">
-              <a:buFont typeface="+mj-lt"/>
-              <a:buAutoNum type="arabicPeriod"/>
-            </a:pPr>
-            <a:r>
-              <a:rPr lang="en-US" dirty="0"/>
-              <a:t>http://doc.qt.io/qt-5/threads-technologies.html</a:t>
-            </a:r>
-          </a:p>
-        </p:txBody>
-      </p:sp>
-      <p:sp>
-        <p:nvSpPr>
-          <p:cNvPr id="4" name="Footer Placeholder 3"/>
+        </p:nvPicPr>
+        <p:blipFill>
+          <a:blip r:embed="rId2">
+            <a:extLst>
+              <a:ext uri="{28A0092B-C50C-407E-A947-70E740481C1C}">
+                <a14:useLocalDpi xmlns:a14="http://schemas.microsoft.com/office/drawing/2010/main" val="0"/>
+              </a:ext>
+            </a:extLst>
+          </a:blip>
+          <a:stretch>
+            <a:fillRect/>
+          </a:stretch>
+        </p:blipFill>
+        <p:spPr>
+          <a:xfrm>
+            <a:off x="3599278" y="2594610"/>
+            <a:ext cx="4993445" cy="2931476"/>
+          </a:xfrm>
+        </p:spPr>
+      </p:pic>
+      <p:sp>
+        <p:nvSpPr>
+          <p:cNvPr id="6" name="Footer Placeholder 5"/>
           <p:cNvSpPr>
             <a:spLocks noGrp="1"/>
           </p:cNvSpPr>
@@ -7775,7 +7964,7 @@
     </p:spTree>
     <p:extLst>
       <p:ext uri="{BB962C8B-B14F-4D97-AF65-F5344CB8AC3E}">
-        <p14:creationId xmlns:p14="http://schemas.microsoft.com/office/powerpoint/2010/main" val="1354100329"/>
+        <p14:creationId xmlns:p14="http://schemas.microsoft.com/office/powerpoint/2010/main" val="1103392470"/>
       </p:ext>
     </p:extLst>
   </p:cSld>
@@ -7867,11 +8056,7 @@
             </a:r>
             <a:r>
               <a:rPr lang="en-US" dirty="0" smtClean="0"/>
-              <a:t> </a:t>
-            </a:r>
-            <a:r>
-              <a:rPr lang="en-US" dirty="0" smtClean="0"/>
-              <a:t>Multithreading</a:t>
+              <a:t> Multithreading</a:t>
             </a:r>
           </a:p>
           <a:p>
@@ -7921,6 +8106,1143 @@
     <p:extLst>
       <p:ext uri="{BB962C8B-B14F-4D97-AF65-F5344CB8AC3E}">
         <p14:creationId xmlns:p14="http://schemas.microsoft.com/office/powerpoint/2010/main" val="2154394761"/>
+      </p:ext>
+    </p:extLst>
+  </p:cSld>
+  <p:clrMapOvr>
+    <a:masterClrMapping/>
+  </p:clrMapOvr>
+  <p:timing>
+    <p:tnLst>
+      <p:par>
+        <p:cTn id="1" dur="indefinite" restart="never" nodeType="tmRoot"/>
+      </p:par>
+    </p:tnLst>
+  </p:timing>
+</p:sld>
+</file>
+
+<file path=ppt/slides/slide20.xml><?xml version="1.0" encoding="utf-8"?>
+<p:sld xmlns:a="http://schemas.openxmlformats.org/drawingml/2006/main" xmlns:r="http://schemas.openxmlformats.org/officeDocument/2006/relationships" xmlns:p="http://schemas.openxmlformats.org/presentationml/2006/main">
+  <p:cSld>
+    <p:spTree>
+      <p:nvGrpSpPr>
+        <p:cNvPr id="1" name=""/>
+        <p:cNvGrpSpPr/>
+        <p:nvPr/>
+      </p:nvGrpSpPr>
+      <p:grpSpPr>
+        <a:xfrm>
+          <a:off x="0" y="0"/>
+          <a:ext cx="0" cy="0"/>
+          <a:chOff x="0" y="0"/>
+          <a:chExt cx="0" cy="0"/>
+        </a:xfrm>
+      </p:grpSpPr>
+      <p:sp>
+        <p:nvSpPr>
+          <p:cNvPr id="2" name="Title 1"/>
+          <p:cNvSpPr>
+            <a:spLocks noGrp="1"/>
+          </p:cNvSpPr>
+          <p:nvPr>
+            <p:ph type="title"/>
+          </p:nvPr>
+        </p:nvSpPr>
+        <p:spPr/>
+        <p:txBody>
+          <a:bodyPr/>
+          <a:lstStyle/>
+          <a:p>
+            <a:r>
+              <a:rPr lang="en-US" dirty="0" smtClean="0"/>
+              <a:t>Queued Connection</a:t>
+            </a:r>
+            <a:endParaRPr lang="en-US" dirty="0"/>
+          </a:p>
+        </p:txBody>
+      </p:sp>
+      <p:sp>
+        <p:nvSpPr>
+          <p:cNvPr id="3" name="Content Placeholder 2"/>
+          <p:cNvSpPr>
+            <a:spLocks noGrp="1"/>
+          </p:cNvSpPr>
+          <p:nvPr>
+            <p:ph idx="1"/>
+          </p:nvPr>
+        </p:nvSpPr>
+        <p:spPr/>
+        <p:txBody>
+          <a:bodyPr/>
+          <a:lstStyle/>
+          <a:p>
+            <a:r>
+              <a:rPr lang="en-US" dirty="0" smtClean="0"/>
+              <a:t>When a signal is emitted, it is placed on the event queue of the </a:t>
+            </a:r>
+            <a:r>
+              <a:rPr lang="en-US" dirty="0" err="1" smtClean="0"/>
+              <a:t>QObject</a:t>
+            </a:r>
+            <a:r>
+              <a:rPr lang="en-US" dirty="0"/>
+              <a:t> </a:t>
+            </a:r>
+            <a:r>
+              <a:rPr lang="en-US" dirty="0" smtClean="0"/>
+              <a:t>containing the slot to be executed</a:t>
+            </a:r>
+          </a:p>
+          <a:p>
+            <a:r>
+              <a:rPr lang="en-US" dirty="0"/>
+              <a:t>A</a:t>
+            </a:r>
+            <a:r>
+              <a:rPr lang="en-US" dirty="0" smtClean="0"/>
+              <a:t>fter the signal is emitted, execution of the code after the signal continues.</a:t>
+            </a:r>
+          </a:p>
+          <a:p>
+            <a:r>
+              <a:rPr lang="en-US" dirty="0" smtClean="0"/>
+              <a:t>The slot will be executed when the event is queued up on the corresponding thread</a:t>
+            </a:r>
+            <a:endParaRPr lang="en-US" dirty="0"/>
+          </a:p>
+        </p:txBody>
+      </p:sp>
+      <p:sp>
+        <p:nvSpPr>
+          <p:cNvPr id="4" name="Footer Placeholder 3"/>
+          <p:cNvSpPr>
+            <a:spLocks noGrp="1"/>
+          </p:cNvSpPr>
+          <p:nvPr>
+            <p:ph type="ftr" sz="quarter" idx="11"/>
+          </p:nvPr>
+        </p:nvSpPr>
+        <p:spPr/>
+        <p:txBody>
+          <a:bodyPr/>
+          <a:lstStyle/>
+          <a:p>
+            <a:endParaRPr lang="en-US"/>
+          </a:p>
+        </p:txBody>
+      </p:sp>
+    </p:spTree>
+    <p:extLst>
+      <p:ext uri="{BB962C8B-B14F-4D97-AF65-F5344CB8AC3E}">
+        <p14:creationId xmlns:p14="http://schemas.microsoft.com/office/powerpoint/2010/main" val="1924793217"/>
+      </p:ext>
+    </p:extLst>
+  </p:cSld>
+  <p:clrMapOvr>
+    <a:masterClrMapping/>
+  </p:clrMapOvr>
+  <p:timing>
+    <p:tnLst>
+      <p:par>
+        <p:cTn id="1" dur="indefinite" restart="never" nodeType="tmRoot"/>
+      </p:par>
+    </p:tnLst>
+  </p:timing>
+</p:sld>
+</file>
+
+<file path=ppt/slides/slide21.xml><?xml version="1.0" encoding="utf-8"?>
+<p:sld xmlns:a="http://schemas.openxmlformats.org/drawingml/2006/main" xmlns:r="http://schemas.openxmlformats.org/officeDocument/2006/relationships" xmlns:p="http://schemas.openxmlformats.org/presentationml/2006/main">
+  <p:cSld>
+    <p:spTree>
+      <p:nvGrpSpPr>
+        <p:cNvPr id="1" name=""/>
+        <p:cNvGrpSpPr/>
+        <p:nvPr/>
+      </p:nvGrpSpPr>
+      <p:grpSpPr>
+        <a:xfrm>
+          <a:off x="0" y="0"/>
+          <a:ext cx="0" cy="0"/>
+          <a:chOff x="0" y="0"/>
+          <a:chExt cx="0" cy="0"/>
+        </a:xfrm>
+      </p:grpSpPr>
+      <p:sp>
+        <p:nvSpPr>
+          <p:cNvPr id="2" name="Title 1"/>
+          <p:cNvSpPr>
+            <a:spLocks noGrp="1"/>
+          </p:cNvSpPr>
+          <p:nvPr>
+            <p:ph type="title"/>
+          </p:nvPr>
+        </p:nvSpPr>
+        <p:spPr/>
+        <p:txBody>
+          <a:bodyPr/>
+          <a:lstStyle/>
+          <a:p>
+            <a:r>
+              <a:rPr lang="en-US" dirty="0" smtClean="0"/>
+              <a:t>Example: Queued Connection</a:t>
+            </a:r>
+            <a:endParaRPr lang="en-US" dirty="0"/>
+          </a:p>
+        </p:txBody>
+      </p:sp>
+      <p:pic>
+        <p:nvPicPr>
+          <p:cNvPr id="5" name="Content Placeholder 4"/>
+          <p:cNvPicPr>
+            <a:picLocks noGrp="1" noChangeAspect="1"/>
+          </p:cNvPicPr>
+          <p:nvPr>
+            <p:ph idx="1"/>
+          </p:nvPr>
+        </p:nvPicPr>
+        <p:blipFill>
+          <a:blip r:embed="rId2">
+            <a:extLst>
+              <a:ext uri="{28A0092B-C50C-407E-A947-70E740481C1C}">
+                <a14:useLocalDpi xmlns:a14="http://schemas.microsoft.com/office/drawing/2010/main" val="0"/>
+              </a:ext>
+            </a:extLst>
+          </a:blip>
+          <a:stretch>
+            <a:fillRect/>
+          </a:stretch>
+        </p:blipFill>
+        <p:spPr>
+          <a:xfrm>
+            <a:off x="834648" y="1515427"/>
+            <a:ext cx="4857409" cy="5068601"/>
+          </a:xfrm>
+        </p:spPr>
+      </p:pic>
+      <p:sp>
+        <p:nvSpPr>
+          <p:cNvPr id="4" name="Footer Placeholder 3"/>
+          <p:cNvSpPr>
+            <a:spLocks noGrp="1"/>
+          </p:cNvSpPr>
+          <p:nvPr>
+            <p:ph type="ftr" sz="quarter" idx="11"/>
+          </p:nvPr>
+        </p:nvSpPr>
+        <p:spPr/>
+        <p:txBody>
+          <a:bodyPr/>
+          <a:lstStyle/>
+          <a:p>
+            <a:endParaRPr lang="en-US"/>
+          </a:p>
+        </p:txBody>
+      </p:sp>
+      <p:pic>
+        <p:nvPicPr>
+          <p:cNvPr id="6" name="Picture 5"/>
+          <p:cNvPicPr>
+            <a:picLocks noChangeAspect="1"/>
+          </p:cNvPicPr>
+          <p:nvPr/>
+        </p:nvPicPr>
+        <p:blipFill>
+          <a:blip r:embed="rId3">
+            <a:extLst>
+              <a:ext uri="{28A0092B-C50C-407E-A947-70E740481C1C}">
+                <a14:useLocalDpi xmlns:a14="http://schemas.microsoft.com/office/drawing/2010/main" val="0"/>
+              </a:ext>
+            </a:extLst>
+          </a:blip>
+          <a:stretch>
+            <a:fillRect/>
+          </a:stretch>
+        </p:blipFill>
+        <p:spPr>
+          <a:xfrm>
+            <a:off x="6441384" y="2082540"/>
+            <a:ext cx="5344271" cy="3934374"/>
+          </a:xfrm>
+          <a:prstGeom prst="rect">
+            <a:avLst/>
+          </a:prstGeom>
+        </p:spPr>
+      </p:pic>
+    </p:spTree>
+    <p:extLst>
+      <p:ext uri="{BB962C8B-B14F-4D97-AF65-F5344CB8AC3E}">
+        <p14:creationId xmlns:p14="http://schemas.microsoft.com/office/powerpoint/2010/main" val="1542041918"/>
+      </p:ext>
+    </p:extLst>
+  </p:cSld>
+  <p:clrMapOvr>
+    <a:masterClrMapping/>
+  </p:clrMapOvr>
+  <p:timing>
+    <p:tnLst>
+      <p:par>
+        <p:cTn id="1" dur="indefinite" restart="never" nodeType="tmRoot"/>
+      </p:par>
+    </p:tnLst>
+  </p:timing>
+</p:sld>
+</file>
+
+<file path=ppt/slides/slide22.xml><?xml version="1.0" encoding="utf-8"?>
+<p:sld xmlns:a="http://schemas.openxmlformats.org/drawingml/2006/main" xmlns:r="http://schemas.openxmlformats.org/officeDocument/2006/relationships" xmlns:p="http://schemas.openxmlformats.org/presentationml/2006/main">
+  <p:cSld>
+    <p:spTree>
+      <p:nvGrpSpPr>
+        <p:cNvPr id="1" name=""/>
+        <p:cNvGrpSpPr/>
+        <p:nvPr/>
+      </p:nvGrpSpPr>
+      <p:grpSpPr>
+        <a:xfrm>
+          <a:off x="0" y="0"/>
+          <a:ext cx="0" cy="0"/>
+          <a:chOff x="0" y="0"/>
+          <a:chExt cx="0" cy="0"/>
+        </a:xfrm>
+      </p:grpSpPr>
+      <p:sp>
+        <p:nvSpPr>
+          <p:cNvPr id="2" name="Title 1"/>
+          <p:cNvSpPr>
+            <a:spLocks noGrp="1"/>
+          </p:cNvSpPr>
+          <p:nvPr>
+            <p:ph type="title"/>
+          </p:nvPr>
+        </p:nvSpPr>
+        <p:spPr/>
+        <p:txBody>
+          <a:bodyPr/>
+          <a:lstStyle/>
+          <a:p>
+            <a:r>
+              <a:rPr lang="en-US" dirty="0"/>
+              <a:t>Example: Queued </a:t>
+            </a:r>
+            <a:r>
+              <a:rPr lang="en-US" dirty="0" smtClean="0"/>
+              <a:t>Connection (Cont.)</a:t>
+            </a:r>
+            <a:endParaRPr lang="en-US" dirty="0"/>
+          </a:p>
+        </p:txBody>
+      </p:sp>
+      <p:pic>
+        <p:nvPicPr>
+          <p:cNvPr id="5" name="Content Placeholder 4"/>
+          <p:cNvPicPr>
+            <a:picLocks noGrp="1" noChangeAspect="1"/>
+          </p:cNvPicPr>
+          <p:nvPr>
+            <p:ph idx="1"/>
+          </p:nvPr>
+        </p:nvPicPr>
+        <p:blipFill>
+          <a:blip r:embed="rId2">
+            <a:extLst>
+              <a:ext uri="{28A0092B-C50C-407E-A947-70E740481C1C}">
+                <a14:useLocalDpi xmlns:a14="http://schemas.microsoft.com/office/drawing/2010/main" val="0"/>
+              </a:ext>
+            </a:extLst>
+          </a:blip>
+          <a:stretch>
+            <a:fillRect/>
+          </a:stretch>
+        </p:blipFill>
+        <p:spPr>
+          <a:xfrm>
+            <a:off x="3831770" y="2148841"/>
+            <a:ext cx="4528460" cy="3784982"/>
+          </a:xfrm>
+        </p:spPr>
+      </p:pic>
+      <p:sp>
+        <p:nvSpPr>
+          <p:cNvPr id="4" name="Footer Placeholder 3"/>
+          <p:cNvSpPr>
+            <a:spLocks noGrp="1"/>
+          </p:cNvSpPr>
+          <p:nvPr>
+            <p:ph type="ftr" sz="quarter" idx="11"/>
+          </p:nvPr>
+        </p:nvSpPr>
+        <p:spPr/>
+        <p:txBody>
+          <a:bodyPr/>
+          <a:lstStyle/>
+          <a:p>
+            <a:endParaRPr lang="en-US"/>
+          </a:p>
+        </p:txBody>
+      </p:sp>
+    </p:spTree>
+    <p:extLst>
+      <p:ext uri="{BB962C8B-B14F-4D97-AF65-F5344CB8AC3E}">
+        <p14:creationId xmlns:p14="http://schemas.microsoft.com/office/powerpoint/2010/main" val="780237934"/>
+      </p:ext>
+    </p:extLst>
+  </p:cSld>
+  <p:clrMapOvr>
+    <a:masterClrMapping/>
+  </p:clrMapOvr>
+  <p:timing>
+    <p:tnLst>
+      <p:par>
+        <p:cTn id="1" dur="indefinite" restart="never" nodeType="tmRoot"/>
+      </p:par>
+    </p:tnLst>
+  </p:timing>
+</p:sld>
+</file>
+
+<file path=ppt/slides/slide23.xml><?xml version="1.0" encoding="utf-8"?>
+<p:sld xmlns:a="http://schemas.openxmlformats.org/drawingml/2006/main" xmlns:r="http://schemas.openxmlformats.org/officeDocument/2006/relationships" xmlns:p="http://schemas.openxmlformats.org/presentationml/2006/main">
+  <p:cSld>
+    <p:spTree>
+      <p:nvGrpSpPr>
+        <p:cNvPr id="1" name=""/>
+        <p:cNvGrpSpPr/>
+        <p:nvPr/>
+      </p:nvGrpSpPr>
+      <p:grpSpPr>
+        <a:xfrm>
+          <a:off x="0" y="0"/>
+          <a:ext cx="0" cy="0"/>
+          <a:chOff x="0" y="0"/>
+          <a:chExt cx="0" cy="0"/>
+        </a:xfrm>
+      </p:grpSpPr>
+      <p:sp>
+        <p:nvSpPr>
+          <p:cNvPr id="2" name="Title 1"/>
+          <p:cNvSpPr>
+            <a:spLocks noGrp="1"/>
+          </p:cNvSpPr>
+          <p:nvPr>
+            <p:ph type="title"/>
+          </p:nvPr>
+        </p:nvSpPr>
+        <p:spPr/>
+        <p:txBody>
+          <a:bodyPr/>
+          <a:lstStyle/>
+          <a:p>
+            <a:r>
+              <a:rPr lang="en-US" dirty="0" smtClean="0"/>
+              <a:t>More Details about Signals and Slots</a:t>
+            </a:r>
+            <a:endParaRPr lang="en-US" dirty="0"/>
+          </a:p>
+        </p:txBody>
+      </p:sp>
+      <p:sp>
+        <p:nvSpPr>
+          <p:cNvPr id="3" name="Content Placeholder 2"/>
+          <p:cNvSpPr>
+            <a:spLocks noGrp="1"/>
+          </p:cNvSpPr>
+          <p:nvPr>
+            <p:ph idx="1"/>
+          </p:nvPr>
+        </p:nvSpPr>
+        <p:spPr/>
+        <p:txBody>
+          <a:bodyPr/>
+          <a:lstStyle/>
+          <a:p>
+            <a:endParaRPr lang="en-US"/>
+          </a:p>
+        </p:txBody>
+      </p:sp>
+      <p:sp>
+        <p:nvSpPr>
+          <p:cNvPr id="4" name="Footer Placeholder 3"/>
+          <p:cNvSpPr>
+            <a:spLocks noGrp="1"/>
+          </p:cNvSpPr>
+          <p:nvPr>
+            <p:ph type="ftr" sz="quarter" idx="11"/>
+          </p:nvPr>
+        </p:nvSpPr>
+        <p:spPr/>
+        <p:txBody>
+          <a:bodyPr/>
+          <a:lstStyle/>
+          <a:p>
+            <a:endParaRPr lang="en-US"/>
+          </a:p>
+        </p:txBody>
+      </p:sp>
+    </p:spTree>
+    <p:extLst>
+      <p:ext uri="{BB962C8B-B14F-4D97-AF65-F5344CB8AC3E}">
+        <p14:creationId xmlns:p14="http://schemas.microsoft.com/office/powerpoint/2010/main" val="613197466"/>
+      </p:ext>
+    </p:extLst>
+  </p:cSld>
+  <p:clrMapOvr>
+    <a:masterClrMapping/>
+  </p:clrMapOvr>
+  <p:timing>
+    <p:tnLst>
+      <p:par>
+        <p:cTn id="1" dur="indefinite" restart="never" nodeType="tmRoot"/>
+      </p:par>
+    </p:tnLst>
+  </p:timing>
+</p:sld>
+</file>
+
+<file path=ppt/slides/slide24.xml><?xml version="1.0" encoding="utf-8"?>
+<p:sld xmlns:a="http://schemas.openxmlformats.org/drawingml/2006/main" xmlns:r="http://schemas.openxmlformats.org/officeDocument/2006/relationships" xmlns:p="http://schemas.openxmlformats.org/presentationml/2006/main">
+  <p:cSld>
+    <p:spTree>
+      <p:nvGrpSpPr>
+        <p:cNvPr id="1" name=""/>
+        <p:cNvGrpSpPr/>
+        <p:nvPr/>
+      </p:nvGrpSpPr>
+      <p:grpSpPr>
+        <a:xfrm>
+          <a:off x="0" y="0"/>
+          <a:ext cx="0" cy="0"/>
+          <a:chOff x="0" y="0"/>
+          <a:chExt cx="0" cy="0"/>
+        </a:xfrm>
+      </p:grpSpPr>
+      <p:sp>
+        <p:nvSpPr>
+          <p:cNvPr id="2" name="Title 1"/>
+          <p:cNvSpPr>
+            <a:spLocks noGrp="1"/>
+          </p:cNvSpPr>
+          <p:nvPr>
+            <p:ph type="title"/>
+          </p:nvPr>
+        </p:nvSpPr>
+        <p:spPr/>
+        <p:txBody>
+          <a:bodyPr/>
+          <a:lstStyle/>
+          <a:p>
+            <a:r>
+              <a:rPr lang="en-US" dirty="0" smtClean="0"/>
+              <a:t>Example: Let’s Put It All Together</a:t>
+            </a:r>
+            <a:endParaRPr lang="en-US" dirty="0"/>
+          </a:p>
+        </p:txBody>
+      </p:sp>
+      <p:pic>
+        <p:nvPicPr>
+          <p:cNvPr id="5" name="Content Placeholder 4"/>
+          <p:cNvPicPr>
+            <a:picLocks noGrp="1" noChangeAspect="1"/>
+          </p:cNvPicPr>
+          <p:nvPr>
+            <p:ph idx="1"/>
+          </p:nvPr>
+        </p:nvPicPr>
+        <p:blipFill>
+          <a:blip r:embed="rId2">
+            <a:extLst>
+              <a:ext uri="{28A0092B-C50C-407E-A947-70E740481C1C}">
+                <a14:useLocalDpi xmlns:a14="http://schemas.microsoft.com/office/drawing/2010/main" val="0"/>
+              </a:ext>
+            </a:extLst>
+          </a:blip>
+          <a:stretch>
+            <a:fillRect/>
+          </a:stretch>
+        </p:blipFill>
+        <p:spPr>
+          <a:xfrm>
+            <a:off x="3958590" y="1315582"/>
+            <a:ext cx="4274820" cy="5026944"/>
+          </a:xfrm>
+        </p:spPr>
+      </p:pic>
+      <p:sp>
+        <p:nvSpPr>
+          <p:cNvPr id="4" name="Footer Placeholder 3"/>
+          <p:cNvSpPr>
+            <a:spLocks noGrp="1"/>
+          </p:cNvSpPr>
+          <p:nvPr>
+            <p:ph type="ftr" sz="quarter" idx="11"/>
+          </p:nvPr>
+        </p:nvSpPr>
+        <p:spPr/>
+        <p:txBody>
+          <a:bodyPr/>
+          <a:lstStyle/>
+          <a:p>
+            <a:endParaRPr lang="en-US"/>
+          </a:p>
+        </p:txBody>
+      </p:sp>
+    </p:spTree>
+    <p:extLst>
+      <p:ext uri="{BB962C8B-B14F-4D97-AF65-F5344CB8AC3E}">
+        <p14:creationId xmlns:p14="http://schemas.microsoft.com/office/powerpoint/2010/main" val="2505696057"/>
+      </p:ext>
+    </p:extLst>
+  </p:cSld>
+  <p:clrMapOvr>
+    <a:masterClrMapping/>
+  </p:clrMapOvr>
+  <p:timing>
+    <p:tnLst>
+      <p:par>
+        <p:cTn id="1" dur="indefinite" restart="never" nodeType="tmRoot"/>
+      </p:par>
+    </p:tnLst>
+  </p:timing>
+</p:sld>
+</file>
+
+<file path=ppt/slides/slide25.xml><?xml version="1.0" encoding="utf-8"?>
+<p:sld xmlns:a="http://schemas.openxmlformats.org/drawingml/2006/main" xmlns:r="http://schemas.openxmlformats.org/officeDocument/2006/relationships" xmlns:p="http://schemas.openxmlformats.org/presentationml/2006/main">
+  <p:cSld>
+    <p:spTree>
+      <p:nvGrpSpPr>
+        <p:cNvPr id="1" name=""/>
+        <p:cNvGrpSpPr/>
+        <p:nvPr/>
+      </p:nvGrpSpPr>
+      <p:grpSpPr>
+        <a:xfrm>
+          <a:off x="0" y="0"/>
+          <a:ext cx="0" cy="0"/>
+          <a:chOff x="0" y="0"/>
+          <a:chExt cx="0" cy="0"/>
+        </a:xfrm>
+      </p:grpSpPr>
+      <p:sp>
+        <p:nvSpPr>
+          <p:cNvPr id="2" name="Title 1"/>
+          <p:cNvSpPr>
+            <a:spLocks noGrp="1"/>
+          </p:cNvSpPr>
+          <p:nvPr>
+            <p:ph type="title"/>
+          </p:nvPr>
+        </p:nvSpPr>
+        <p:spPr/>
+        <p:txBody>
+          <a:bodyPr/>
+          <a:lstStyle/>
+          <a:p>
+            <a:r>
+              <a:rPr lang="en-US" dirty="0"/>
+              <a:t>Example: Let’s Put It All </a:t>
+            </a:r>
+            <a:r>
+              <a:rPr lang="en-US" dirty="0" smtClean="0"/>
+              <a:t>Together (Cont.)</a:t>
+            </a:r>
+            <a:endParaRPr lang="en-US" dirty="0"/>
+          </a:p>
+        </p:txBody>
+      </p:sp>
+      <p:pic>
+        <p:nvPicPr>
+          <p:cNvPr id="4" name="Content Placeholder 3"/>
+          <p:cNvPicPr>
+            <a:picLocks noGrp="1" noChangeAspect="1"/>
+          </p:cNvPicPr>
+          <p:nvPr>
+            <p:ph idx="1"/>
+          </p:nvPr>
+        </p:nvPicPr>
+        <p:blipFill>
+          <a:blip r:embed="rId2">
+            <a:extLst>
+              <a:ext uri="{28A0092B-C50C-407E-A947-70E740481C1C}">
+                <a14:useLocalDpi xmlns:a14="http://schemas.microsoft.com/office/drawing/2010/main" val="0"/>
+              </a:ext>
+            </a:extLst>
+          </a:blip>
+          <a:stretch>
+            <a:fillRect/>
+          </a:stretch>
+        </p:blipFill>
+        <p:spPr>
+          <a:xfrm>
+            <a:off x="1298318" y="1853248"/>
+            <a:ext cx="3536571" cy="4726699"/>
+          </a:xfrm>
+        </p:spPr>
+      </p:pic>
+      <p:pic>
+        <p:nvPicPr>
+          <p:cNvPr id="5" name="Picture 4"/>
+          <p:cNvPicPr>
+            <a:picLocks noChangeAspect="1"/>
+          </p:cNvPicPr>
+          <p:nvPr/>
+        </p:nvPicPr>
+        <p:blipFill>
+          <a:blip r:embed="rId3">
+            <a:extLst>
+              <a:ext uri="{28A0092B-C50C-407E-A947-70E740481C1C}">
+                <a14:useLocalDpi xmlns:a14="http://schemas.microsoft.com/office/drawing/2010/main" val="0"/>
+              </a:ext>
+            </a:extLst>
+          </a:blip>
+          <a:stretch>
+            <a:fillRect/>
+          </a:stretch>
+        </p:blipFill>
+        <p:spPr>
+          <a:xfrm>
+            <a:off x="6586070" y="1152983"/>
+            <a:ext cx="3464764" cy="5513742"/>
+          </a:xfrm>
+          <a:prstGeom prst="rect">
+            <a:avLst/>
+          </a:prstGeom>
+        </p:spPr>
+      </p:pic>
+      <p:sp>
+        <p:nvSpPr>
+          <p:cNvPr id="6" name="Footer Placeholder 5"/>
+          <p:cNvSpPr>
+            <a:spLocks noGrp="1"/>
+          </p:cNvSpPr>
+          <p:nvPr>
+            <p:ph type="ftr" sz="quarter" idx="11"/>
+          </p:nvPr>
+        </p:nvSpPr>
+        <p:spPr/>
+        <p:txBody>
+          <a:bodyPr/>
+          <a:lstStyle/>
+          <a:p>
+            <a:endParaRPr lang="en-US"/>
+          </a:p>
+        </p:txBody>
+      </p:sp>
+    </p:spTree>
+    <p:extLst>
+      <p:ext uri="{BB962C8B-B14F-4D97-AF65-F5344CB8AC3E}">
+        <p14:creationId xmlns:p14="http://schemas.microsoft.com/office/powerpoint/2010/main" val="2872000987"/>
+      </p:ext>
+    </p:extLst>
+  </p:cSld>
+  <p:clrMapOvr>
+    <a:masterClrMapping/>
+  </p:clrMapOvr>
+  <p:timing>
+    <p:tnLst>
+      <p:par>
+        <p:cTn id="1" dur="indefinite" restart="never" nodeType="tmRoot"/>
+      </p:par>
+    </p:tnLst>
+  </p:timing>
+</p:sld>
+</file>
+
+<file path=ppt/slides/slide26.xml><?xml version="1.0" encoding="utf-8"?>
+<p:sld xmlns:a="http://schemas.openxmlformats.org/drawingml/2006/main" xmlns:r="http://schemas.openxmlformats.org/officeDocument/2006/relationships" xmlns:p="http://schemas.openxmlformats.org/presentationml/2006/main">
+  <p:cSld>
+    <p:spTree>
+      <p:nvGrpSpPr>
+        <p:cNvPr id="1" name=""/>
+        <p:cNvGrpSpPr/>
+        <p:nvPr/>
+      </p:nvGrpSpPr>
+      <p:grpSpPr>
+        <a:xfrm>
+          <a:off x="0" y="0"/>
+          <a:ext cx="0" cy="0"/>
+          <a:chOff x="0" y="0"/>
+          <a:chExt cx="0" cy="0"/>
+        </a:xfrm>
+      </p:grpSpPr>
+      <p:sp>
+        <p:nvSpPr>
+          <p:cNvPr id="2" name="Title 1"/>
+          <p:cNvSpPr>
+            <a:spLocks noGrp="1"/>
+          </p:cNvSpPr>
+          <p:nvPr>
+            <p:ph type="title"/>
+          </p:nvPr>
+        </p:nvSpPr>
+        <p:spPr/>
+        <p:txBody>
+          <a:bodyPr/>
+          <a:lstStyle/>
+          <a:p>
+            <a:r>
+              <a:rPr lang="en-US" dirty="0"/>
+              <a:t>Example: Let’s Put It All Together (Cont.)</a:t>
+            </a:r>
+          </a:p>
+        </p:txBody>
+      </p:sp>
+      <p:pic>
+        <p:nvPicPr>
+          <p:cNvPr id="4" name="Content Placeholder 3"/>
+          <p:cNvPicPr>
+            <a:picLocks noGrp="1" noChangeAspect="1"/>
+          </p:cNvPicPr>
+          <p:nvPr>
+            <p:ph idx="1"/>
+          </p:nvPr>
+        </p:nvPicPr>
+        <p:blipFill>
+          <a:blip r:embed="rId2">
+            <a:extLst>
+              <a:ext uri="{28A0092B-C50C-407E-A947-70E740481C1C}">
+                <a14:useLocalDpi xmlns:a14="http://schemas.microsoft.com/office/drawing/2010/main" val="0"/>
+              </a:ext>
+            </a:extLst>
+          </a:blip>
+          <a:stretch>
+            <a:fillRect/>
+          </a:stretch>
+        </p:blipFill>
+        <p:spPr>
+          <a:xfrm>
+            <a:off x="110758" y="2212658"/>
+            <a:ext cx="3716772" cy="3764250"/>
+          </a:xfrm>
+        </p:spPr>
+      </p:pic>
+      <p:pic>
+        <p:nvPicPr>
+          <p:cNvPr id="5" name="Picture 4"/>
+          <p:cNvPicPr>
+            <a:picLocks noChangeAspect="1"/>
+          </p:cNvPicPr>
+          <p:nvPr/>
+        </p:nvPicPr>
+        <p:blipFill>
+          <a:blip r:embed="rId3">
+            <a:extLst>
+              <a:ext uri="{28A0092B-C50C-407E-A947-70E740481C1C}">
+                <a14:useLocalDpi xmlns:a14="http://schemas.microsoft.com/office/drawing/2010/main" val="0"/>
+              </a:ext>
+            </a:extLst>
+          </a:blip>
+          <a:stretch>
+            <a:fillRect/>
+          </a:stretch>
+        </p:blipFill>
+        <p:spPr>
+          <a:xfrm>
+            <a:off x="4054534" y="1784587"/>
+            <a:ext cx="4018350" cy="4785426"/>
+          </a:xfrm>
+          <a:prstGeom prst="rect">
+            <a:avLst/>
+          </a:prstGeom>
+        </p:spPr>
+      </p:pic>
+      <p:pic>
+        <p:nvPicPr>
+          <p:cNvPr id="6" name="Picture 5"/>
+          <p:cNvPicPr>
+            <a:picLocks noChangeAspect="1"/>
+          </p:cNvPicPr>
+          <p:nvPr/>
+        </p:nvPicPr>
+        <p:blipFill>
+          <a:blip r:embed="rId4">
+            <a:extLst>
+              <a:ext uri="{28A0092B-C50C-407E-A947-70E740481C1C}">
+                <a14:useLocalDpi xmlns:a14="http://schemas.microsoft.com/office/drawing/2010/main" val="0"/>
+              </a:ext>
+            </a:extLst>
+          </a:blip>
+          <a:stretch>
+            <a:fillRect/>
+          </a:stretch>
+        </p:blipFill>
+        <p:spPr>
+          <a:xfrm>
+            <a:off x="8299888" y="2548159"/>
+            <a:ext cx="3779879" cy="3258282"/>
+          </a:xfrm>
+          <a:prstGeom prst="rect">
+            <a:avLst/>
+          </a:prstGeom>
+        </p:spPr>
+      </p:pic>
+      <p:sp>
+        <p:nvSpPr>
+          <p:cNvPr id="7" name="Footer Placeholder 6"/>
+          <p:cNvSpPr>
+            <a:spLocks noGrp="1"/>
+          </p:cNvSpPr>
+          <p:nvPr>
+            <p:ph type="ftr" sz="quarter" idx="11"/>
+          </p:nvPr>
+        </p:nvSpPr>
+        <p:spPr/>
+        <p:txBody>
+          <a:bodyPr/>
+          <a:lstStyle/>
+          <a:p>
+            <a:endParaRPr lang="en-US"/>
+          </a:p>
+        </p:txBody>
+      </p:sp>
+    </p:spTree>
+    <p:extLst>
+      <p:ext uri="{BB962C8B-B14F-4D97-AF65-F5344CB8AC3E}">
+        <p14:creationId xmlns:p14="http://schemas.microsoft.com/office/powerpoint/2010/main" val="2079136095"/>
+      </p:ext>
+    </p:extLst>
+  </p:cSld>
+  <p:clrMapOvr>
+    <a:masterClrMapping/>
+  </p:clrMapOvr>
+  <p:timing>
+    <p:tnLst>
+      <p:par>
+        <p:cTn id="1" dur="indefinite" restart="never" nodeType="tmRoot"/>
+      </p:par>
+    </p:tnLst>
+  </p:timing>
+</p:sld>
+</file>
+
+<file path=ppt/slides/slide27.xml><?xml version="1.0" encoding="utf-8"?>
+<p:sld xmlns:a="http://schemas.openxmlformats.org/drawingml/2006/main" xmlns:r="http://schemas.openxmlformats.org/officeDocument/2006/relationships" xmlns:p="http://schemas.openxmlformats.org/presentationml/2006/main">
+  <p:cSld>
+    <p:spTree>
+      <p:nvGrpSpPr>
+        <p:cNvPr id="1" name=""/>
+        <p:cNvGrpSpPr/>
+        <p:nvPr/>
+      </p:nvGrpSpPr>
+      <p:grpSpPr>
+        <a:xfrm>
+          <a:off x="0" y="0"/>
+          <a:ext cx="0" cy="0"/>
+          <a:chOff x="0" y="0"/>
+          <a:chExt cx="0" cy="0"/>
+        </a:xfrm>
+      </p:grpSpPr>
+      <p:sp>
+        <p:nvSpPr>
+          <p:cNvPr id="2" name="Title 1"/>
+          <p:cNvSpPr>
+            <a:spLocks noGrp="1"/>
+          </p:cNvSpPr>
+          <p:nvPr>
+            <p:ph type="title"/>
+          </p:nvPr>
+        </p:nvSpPr>
+        <p:spPr/>
+        <p:txBody>
+          <a:bodyPr/>
+          <a:lstStyle/>
+          <a:p>
+            <a:r>
+              <a:rPr lang="en-US" dirty="0"/>
+              <a:t>Example: Let’s Put It All Together (Cont.)</a:t>
+            </a:r>
+          </a:p>
+        </p:txBody>
+      </p:sp>
+      <p:pic>
+        <p:nvPicPr>
+          <p:cNvPr id="5" name="Content Placeholder 4"/>
+          <p:cNvPicPr>
+            <a:picLocks noGrp="1" noChangeAspect="1"/>
+          </p:cNvPicPr>
+          <p:nvPr>
+            <p:ph idx="1"/>
+          </p:nvPr>
+        </p:nvPicPr>
+        <p:blipFill>
+          <a:blip r:embed="rId2">
+            <a:extLst>
+              <a:ext uri="{28A0092B-C50C-407E-A947-70E740481C1C}">
+                <a14:useLocalDpi xmlns:a14="http://schemas.microsoft.com/office/drawing/2010/main" val="0"/>
+              </a:ext>
+            </a:extLst>
+          </a:blip>
+          <a:stretch>
+            <a:fillRect/>
+          </a:stretch>
+        </p:blipFill>
+        <p:spPr>
+          <a:xfrm>
+            <a:off x="2867850" y="1304605"/>
+            <a:ext cx="2976500" cy="5153343"/>
+          </a:xfrm>
+        </p:spPr>
+      </p:pic>
+      <p:sp>
+        <p:nvSpPr>
+          <p:cNvPr id="4" name="Footer Placeholder 3"/>
+          <p:cNvSpPr>
+            <a:spLocks noGrp="1"/>
+          </p:cNvSpPr>
+          <p:nvPr>
+            <p:ph type="ftr" sz="quarter" idx="11"/>
+          </p:nvPr>
+        </p:nvSpPr>
+        <p:spPr/>
+        <p:txBody>
+          <a:bodyPr/>
+          <a:lstStyle/>
+          <a:p>
+            <a:endParaRPr lang="en-US"/>
+          </a:p>
+        </p:txBody>
+      </p:sp>
+      <p:pic>
+        <p:nvPicPr>
+          <p:cNvPr id="6" name="Picture 5"/>
+          <p:cNvPicPr>
+            <a:picLocks noChangeAspect="1"/>
+          </p:cNvPicPr>
+          <p:nvPr/>
+        </p:nvPicPr>
+        <p:blipFill>
+          <a:blip r:embed="rId3">
+            <a:extLst>
+              <a:ext uri="{28A0092B-C50C-407E-A947-70E740481C1C}">
+                <a14:useLocalDpi xmlns:a14="http://schemas.microsoft.com/office/drawing/2010/main" val="0"/>
+              </a:ext>
+            </a:extLst>
+          </a:blip>
+          <a:stretch>
+            <a:fillRect/>
+          </a:stretch>
+        </p:blipFill>
+        <p:spPr>
+          <a:xfrm>
+            <a:off x="6374810" y="1304606"/>
+            <a:ext cx="2951254" cy="5153343"/>
+          </a:xfrm>
+          <a:prstGeom prst="rect">
+            <a:avLst/>
+          </a:prstGeom>
+        </p:spPr>
+      </p:pic>
+    </p:spTree>
+    <p:extLst>
+      <p:ext uri="{BB962C8B-B14F-4D97-AF65-F5344CB8AC3E}">
+        <p14:creationId xmlns:p14="http://schemas.microsoft.com/office/powerpoint/2010/main" val="866045870"/>
+      </p:ext>
+    </p:extLst>
+  </p:cSld>
+  <p:clrMapOvr>
+    <a:masterClrMapping/>
+  </p:clrMapOvr>
+  <p:timing>
+    <p:tnLst>
+      <p:par>
+        <p:cTn id="1" dur="indefinite" restart="never" nodeType="tmRoot"/>
+      </p:par>
+    </p:tnLst>
+  </p:timing>
+</p:sld>
+</file>
+
+<file path=ppt/slides/slide28.xml><?xml version="1.0" encoding="utf-8"?>
+<p:sld xmlns:a="http://schemas.openxmlformats.org/drawingml/2006/main" xmlns:r="http://schemas.openxmlformats.org/officeDocument/2006/relationships" xmlns:p="http://schemas.openxmlformats.org/presentationml/2006/main">
+  <p:cSld>
+    <p:spTree>
+      <p:nvGrpSpPr>
+        <p:cNvPr id="1" name=""/>
+        <p:cNvGrpSpPr/>
+        <p:nvPr/>
+      </p:nvGrpSpPr>
+      <p:grpSpPr>
+        <a:xfrm>
+          <a:off x="0" y="0"/>
+          <a:ext cx="0" cy="0"/>
+          <a:chOff x="0" y="0"/>
+          <a:chExt cx="0" cy="0"/>
+        </a:xfrm>
+      </p:grpSpPr>
+      <p:sp>
+        <p:nvSpPr>
+          <p:cNvPr id="2" name="Title 1"/>
+          <p:cNvSpPr>
+            <a:spLocks noGrp="1"/>
+          </p:cNvSpPr>
+          <p:nvPr>
+            <p:ph type="title"/>
+          </p:nvPr>
+        </p:nvSpPr>
+        <p:spPr/>
+        <p:txBody>
+          <a:bodyPr/>
+          <a:lstStyle/>
+          <a:p>
+            <a:r>
+              <a:rPr lang="en-US" dirty="0" smtClean="0"/>
+              <a:t>References</a:t>
+            </a:r>
+            <a:endParaRPr lang="en-US" dirty="0"/>
+          </a:p>
+        </p:txBody>
+      </p:sp>
+      <p:sp>
+        <p:nvSpPr>
+          <p:cNvPr id="3" name="Content Placeholder 2"/>
+          <p:cNvSpPr>
+            <a:spLocks noGrp="1"/>
+          </p:cNvSpPr>
+          <p:nvPr>
+            <p:ph idx="1"/>
+          </p:nvPr>
+        </p:nvSpPr>
+        <p:spPr/>
+        <p:txBody>
+          <a:bodyPr/>
+          <a:lstStyle/>
+          <a:p>
+            <a:pPr marL="457200" indent="-457200">
+              <a:buFont typeface="+mj-lt"/>
+              <a:buAutoNum type="arabicPeriod"/>
+            </a:pPr>
+            <a:r>
+              <a:rPr lang="en-US" dirty="0"/>
+              <a:t>http://doc.qt.io/qt-5/threads-technologies.html</a:t>
+            </a:r>
+          </a:p>
+        </p:txBody>
+      </p:sp>
+      <p:sp>
+        <p:nvSpPr>
+          <p:cNvPr id="4" name="Footer Placeholder 3"/>
+          <p:cNvSpPr>
+            <a:spLocks noGrp="1"/>
+          </p:cNvSpPr>
+          <p:nvPr>
+            <p:ph type="ftr" sz="quarter" idx="11"/>
+          </p:nvPr>
+        </p:nvSpPr>
+        <p:spPr/>
+        <p:txBody>
+          <a:bodyPr/>
+          <a:lstStyle/>
+          <a:p>
+            <a:endParaRPr lang="en-US"/>
+          </a:p>
+        </p:txBody>
+      </p:sp>
+    </p:spTree>
+    <p:extLst>
+      <p:ext uri="{BB962C8B-B14F-4D97-AF65-F5344CB8AC3E}">
+        <p14:creationId xmlns:p14="http://schemas.microsoft.com/office/powerpoint/2010/main" val="1354100329"/>
       </p:ext>
     </p:extLst>
   </p:cSld>
@@ -8703,6 +10025,34 @@
           <a:p>
             <a:pPr lvl="1"/>
             <a:r>
+              <a:rPr lang="en-US" dirty="0"/>
+              <a:t>Create a subclass of </a:t>
+            </a:r>
+            <a:r>
+              <a:rPr lang="en-US" dirty="0" err="1"/>
+              <a:t>Qthread</a:t>
+            </a:r>
+            <a:r>
+              <a:rPr lang="en-US" dirty="0"/>
+              <a:t> and </a:t>
+            </a:r>
+            <a:r>
+              <a:rPr lang="en-US" dirty="0" err="1"/>
+              <a:t>reimplement</a:t>
+            </a:r>
+            <a:r>
+              <a:rPr lang="en-US" dirty="0"/>
+              <a:t> the run() function with your thread’s desired </a:t>
+            </a:r>
+            <a:r>
+              <a:rPr lang="en-US" dirty="0" smtClean="0"/>
+              <a:t>behavior</a:t>
+            </a:r>
+            <a:endParaRPr lang="en-US" dirty="0" smtClean="0"/>
+          </a:p>
+          <a:p>
+            <a:pPr lvl="1"/>
+            <a:r>
               <a:rPr lang="en-US" dirty="0" smtClean="0"/>
               <a:t>Use worker </a:t>
             </a:r>
@@ -8719,29 +10069,6 @@
               <a:t>Qthread</a:t>
             </a:r>
             <a:endParaRPr lang="en-US" dirty="0" smtClean="0"/>
-          </a:p>
-          <a:p>
-            <a:pPr lvl="1"/>
-            <a:r>
-              <a:rPr lang="en-US" dirty="0" smtClean="0"/>
-              <a:t>Create a subclass of </a:t>
-            </a:r>
-            <a:r>
-              <a:rPr lang="en-US" dirty="0" err="1" smtClean="0"/>
-              <a:t>Qthread</a:t>
-            </a:r>
-            <a:r>
-              <a:rPr lang="en-US" dirty="0" smtClean="0"/>
-              <a:t> and </a:t>
-            </a:r>
-            <a:r>
-              <a:rPr lang="en-US" dirty="0" err="1" smtClean="0"/>
-              <a:t>reimplement</a:t>
-            </a:r>
-            <a:r>
-              <a:rPr lang="en-US" dirty="0" smtClean="0"/>
-              <a:t> the run() function with your thread’s desired behavior</a:t>
-            </a:r>
           </a:p>
           <a:p>
             <a:pPr lvl="1"/>
@@ -8821,21 +10148,13 @@
           <a:lstStyle/>
           <a:p>
             <a:r>
-              <a:rPr lang="en-US" dirty="0" smtClean="0"/>
-              <a:t>Worker </a:t>
-            </a:r>
-            <a:r>
-              <a:rPr lang="en-US" dirty="0" err="1" smtClean="0"/>
-              <a:t>QObjects</a:t>
-            </a:r>
-            <a:r>
-              <a:rPr lang="en-US" dirty="0" smtClean="0"/>
-              <a:t> on a </a:t>
-            </a:r>
-            <a:r>
               <a:rPr lang="en-US" dirty="0" err="1" smtClean="0"/>
               <a:t>QThread</a:t>
             </a:r>
+            <a:r>
+              <a:rPr lang="en-US" dirty="0" smtClean="0"/>
+              <a:t> Subclass</a:t>
+            </a:r>
             <a:endParaRPr lang="en-US" dirty="0"/>
           </a:p>
         </p:txBody>
@@ -8857,64 +10176,48 @@
           <a:p>
             <a:r>
               <a:rPr lang="en-US" dirty="0" smtClean="0"/>
-              <a:t>Create classes that inherit from </a:t>
-            </a:r>
-            <a:r>
-              <a:rPr lang="en-US" dirty="0" err="1" smtClean="0"/>
-              <a:t>QOjbect</a:t>
-            </a:r>
-            <a:r>
-              <a:rPr lang="en-US" dirty="0" smtClean="0"/>
-              <a:t> to act as worker object’s on your </a:t>
+              <a:t>Create a class that inherits from </a:t>
             </a:r>
             <a:r>
               <a:rPr lang="en-US" dirty="0" err="1" smtClean="0"/>
               <a:t>QThread</a:t>
             </a:r>
-            <a:endParaRPr lang="en-US" dirty="0"/>
+            <a:endParaRPr lang="en-US" dirty="0" smtClean="0"/>
           </a:p>
           <a:p>
             <a:r>
               <a:rPr lang="en-US" dirty="0" smtClean="0"/>
-              <a:t>Move thread to your </a:t>
+              <a:t>In the subclass, </a:t>
             </a:r>
             <a:r>
               <a:rPr lang="en-US" dirty="0" err="1" smtClean="0"/>
-              <a:t>Qthread</a:t>
+              <a:t>reimplement</a:t>
             </a:r>
             <a:r>
               <a:rPr lang="en-US" dirty="0" smtClean="0"/>
-              <a:t> with the </a:t>
+              <a:t> </a:t>
             </a:r>
             <a:r>
               <a:rPr lang="en-US" dirty="0" err="1" smtClean="0"/>
-              <a:t>QOjbect</a:t>
+              <a:t>QThread’s</a:t>
             </a:r>
             <a:r>
               <a:rPr lang="en-US" dirty="0" smtClean="0"/>
-              <a:t>::</a:t>
+              <a:t> run() function</a:t>
+            </a:r>
+          </a:p>
+          <a:p>
+            <a:r>
+              <a:rPr lang="en-US" dirty="0" smtClean="0"/>
+              <a:t>Now, when you start your </a:t>
             </a:r>
             <a:r>
               <a:rPr lang="en-US" dirty="0" err="1" smtClean="0"/>
-              <a:t>moveToThread</a:t>
+              <a:t>QThread</a:t>
             </a:r>
             <a:r>
               <a:rPr lang="en-US" dirty="0" smtClean="0"/>
-              <a:t>() function</a:t>
-            </a:r>
-          </a:p>
-          <a:p>
-            <a:r>
-              <a:rPr lang="en-US" dirty="0" smtClean="0"/>
-              <a:t>Interact with you new worker objects on different threads using </a:t>
-            </a:r>
-            <a:r>
-              <a:rPr lang="en-US" dirty="0" err="1" smtClean="0"/>
-              <a:t>Qt’s</a:t>
-            </a:r>
-            <a:r>
-              <a:rPr lang="en-US" dirty="0" smtClean="0"/>
-              <a:t> Signals and Slots</a:t>
+              <a:t> subclass, the functionality implemented in the run() function will execute on your new thread</a:t>
             </a:r>
             <a:endParaRPr lang="en-US" dirty="0"/>
           </a:p>
@@ -8942,7 +10245,7 @@
     </p:spTree>
     <p:extLst>
       <p:ext uri="{BB962C8B-B14F-4D97-AF65-F5344CB8AC3E}">
-        <p14:creationId xmlns:p14="http://schemas.microsoft.com/office/powerpoint/2010/main" val="419392018"/>
+        <p14:creationId xmlns:p14="http://schemas.microsoft.com/office/powerpoint/2010/main" val="506777878"/>
       </p:ext>
     </p:extLst>
   </p:cSld>

</xml_diff>